<commit_message>
Pre Submission Commit 2
</commit_message>
<xml_diff>
--- a/PART 2 - RESULTS/Writing Assessment.pptx
+++ b/PART 2 - RESULTS/Writing Assessment.pptx
@@ -6339,8 +6339,8 @@
       </dsp:nvSpPr>
       <dsp:spPr>
         <a:xfrm>
-          <a:off x="20217" y="653"/>
-          <a:ext cx="742500" cy="314131"/>
+          <a:off x="109593" y="605"/>
+          <a:ext cx="922500" cy="291297"/>
         </a:xfrm>
         <a:prstGeom prst="rect">
           <a:avLst/>
@@ -6382,12 +6382,12 @@
         </a:fontRef>
       </dsp:style>
       <dsp:txBody>
-        <a:bodyPr spcFirstLastPara="0" vert="horz" wrap="square" lIns="30480" tIns="30480" rIns="30480" bIns="30480" numCol="1" spcCol="1270" anchor="ctr" anchorCtr="0">
+        <a:bodyPr spcFirstLastPara="0" vert="horz" wrap="square" lIns="38100" tIns="38100" rIns="38100" bIns="38100" numCol="1" spcCol="1270" anchor="ctr" anchorCtr="0">
           <a:noAutofit/>
         </a:bodyPr>
         <a:lstStyle/>
         <a:p>
-          <a:pPr marL="0" lvl="0" indent="0" algn="ctr" defTabSz="533400">
+          <a:pPr marL="0" lvl="0" indent="0" algn="ctr" defTabSz="666750">
             <a:lnSpc>
               <a:spcPct val="90000"/>
             </a:lnSpc>
@@ -6400,14 +6400,14 @@
             <a:buNone/>
           </a:pPr>
           <a:r>
-            <a:rPr lang="en-US" sz="1200" kern="1200" dirty="0"/>
+            <a:rPr lang="en-US" sz="1500" kern="1200" dirty="0"/>
             <a:t>INTERFACE</a:t>
           </a:r>
         </a:p>
       </dsp:txBody>
       <dsp:txXfrm>
-        <a:off x="20217" y="653"/>
-        <a:ext cx="742500" cy="314131"/>
+        <a:off x="109593" y="605"/>
+        <a:ext cx="922500" cy="291297"/>
       </dsp:txXfrm>
     </dsp:sp>
     <dsp:sp modelId="{C5F5EDCF-3A7E-45EF-9FDA-D1FCCFA56577}">
@@ -6417,8 +6417,8 @@
       </dsp:nvSpPr>
       <dsp:spPr>
         <a:xfrm>
-          <a:off x="0" y="330490"/>
-          <a:ext cx="782935" cy="314131"/>
+          <a:off x="0" y="306468"/>
+          <a:ext cx="1141688" cy="291297"/>
         </a:xfrm>
         <a:prstGeom prst="rect">
           <a:avLst/>
@@ -6460,12 +6460,12 @@
         </a:fontRef>
       </dsp:style>
       <dsp:txBody>
-        <a:bodyPr spcFirstLastPara="0" vert="horz" wrap="square" lIns="30480" tIns="30480" rIns="30480" bIns="30480" numCol="1" spcCol="1270" anchor="ctr" anchorCtr="0">
+        <a:bodyPr spcFirstLastPara="0" vert="horz" wrap="square" lIns="38100" tIns="38100" rIns="38100" bIns="38100" numCol="1" spcCol="1270" anchor="ctr" anchorCtr="0">
           <a:noAutofit/>
         </a:bodyPr>
         <a:lstStyle/>
         <a:p>
-          <a:pPr marL="0" lvl="0" indent="0" algn="ctr" defTabSz="533400">
+          <a:pPr marL="0" lvl="0" indent="0" algn="ctr" defTabSz="666750">
             <a:lnSpc>
               <a:spcPct val="90000"/>
             </a:lnSpc>
@@ -6478,14 +6478,14 @@
             <a:buNone/>
           </a:pPr>
           <a:r>
-            <a:rPr lang="en-US" sz="1200" kern="1200" dirty="0"/>
+            <a:rPr lang="en-US" sz="1500" kern="1200" dirty="0"/>
             <a:t>API</a:t>
           </a:r>
         </a:p>
       </dsp:txBody>
       <dsp:txXfrm>
-        <a:off x="0" y="330490"/>
-        <a:ext cx="782935" cy="314131"/>
+        <a:off x="0" y="306468"/>
+        <a:ext cx="1141688" cy="291297"/>
       </dsp:txXfrm>
     </dsp:sp>
     <dsp:sp modelId="{7303B236-C28C-4C71-B4D2-7C3FE7934A12}">
@@ -6495,8 +6495,8 @@
       </dsp:nvSpPr>
       <dsp:spPr>
         <a:xfrm>
-          <a:off x="0" y="660328"/>
-          <a:ext cx="782935" cy="314131"/>
+          <a:off x="39332" y="612330"/>
+          <a:ext cx="1063022" cy="291297"/>
         </a:xfrm>
         <a:prstGeom prst="rect">
           <a:avLst/>
@@ -6538,12 +6538,12 @@
         </a:fontRef>
       </dsp:style>
       <dsp:txBody>
-        <a:bodyPr spcFirstLastPara="0" vert="horz" wrap="square" lIns="30480" tIns="30480" rIns="30480" bIns="30480" numCol="1" spcCol="1270" anchor="ctr" anchorCtr="0">
+        <a:bodyPr spcFirstLastPara="0" vert="horz" wrap="square" lIns="38100" tIns="38100" rIns="38100" bIns="38100" numCol="1" spcCol="1270" anchor="ctr" anchorCtr="0">
           <a:noAutofit/>
         </a:bodyPr>
         <a:lstStyle/>
         <a:p>
-          <a:pPr marL="0" lvl="0" indent="0" algn="ctr" defTabSz="533400">
+          <a:pPr marL="0" lvl="0" indent="0" algn="ctr" defTabSz="666750">
             <a:lnSpc>
               <a:spcPct val="90000"/>
             </a:lnSpc>
@@ -6556,14 +6556,14 @@
             <a:buNone/>
           </a:pPr>
           <a:r>
-            <a:rPr lang="en-US" sz="1200" kern="1200" dirty="0"/>
+            <a:rPr lang="en-US" sz="1500" kern="1200" dirty="0"/>
             <a:t>A, B, C</a:t>
           </a:r>
         </a:p>
       </dsp:txBody>
       <dsp:txXfrm>
-        <a:off x="0" y="660328"/>
-        <a:ext cx="782935" cy="314131"/>
+        <a:off x="39332" y="612330"/>
+        <a:ext cx="1063022" cy="291297"/>
       </dsp:txXfrm>
     </dsp:sp>
     <dsp:sp modelId="{5BB6C684-DF52-4EFF-8A76-DF9CA5243931}">
@@ -6573,8 +6573,8 @@
       </dsp:nvSpPr>
       <dsp:spPr>
         <a:xfrm>
-          <a:off x="0" y="990166"/>
-          <a:ext cx="782935" cy="314131"/>
+          <a:off x="0" y="918193"/>
+          <a:ext cx="1141688" cy="291297"/>
         </a:xfrm>
         <a:prstGeom prst="rect">
           <a:avLst/>
@@ -6616,12 +6616,12 @@
         </a:fontRef>
       </dsp:style>
       <dsp:txBody>
-        <a:bodyPr spcFirstLastPara="0" vert="horz" wrap="square" lIns="30480" tIns="30480" rIns="30480" bIns="30480" numCol="1" spcCol="1270" anchor="ctr" anchorCtr="0">
+        <a:bodyPr spcFirstLastPara="0" vert="horz" wrap="square" lIns="38100" tIns="38100" rIns="38100" bIns="38100" numCol="1" spcCol="1270" anchor="ctr" anchorCtr="0">
           <a:noAutofit/>
         </a:bodyPr>
         <a:lstStyle/>
         <a:p>
-          <a:pPr marL="0" lvl="0" indent="0" algn="ctr" defTabSz="533400">
+          <a:pPr marL="0" lvl="0" indent="0" algn="ctr" defTabSz="666750">
             <a:lnSpc>
               <a:spcPct val="90000"/>
             </a:lnSpc>
@@ -6634,14 +6634,14 @@
             <a:buNone/>
           </a:pPr>
           <a:r>
-            <a:rPr lang="en-US" sz="1200" kern="1200" dirty="0"/>
+            <a:rPr lang="en-US" sz="1500" kern="1200" dirty="0"/>
             <a:t>DB</a:t>
           </a:r>
         </a:p>
       </dsp:txBody>
       <dsp:txXfrm>
-        <a:off x="0" y="990166"/>
-        <a:ext cx="782935" cy="314131"/>
+        <a:off x="0" y="918193"/>
+        <a:ext cx="1141688" cy="291297"/>
       </dsp:txXfrm>
     </dsp:sp>
   </dsp:spTree>
@@ -6969,7 +6969,7 @@
       </dsp:nvSpPr>
       <dsp:spPr>
         <a:xfrm rot="3599998">
-          <a:off x="1080017" y="566981"/>
+          <a:off x="1080017" y="566980"/>
           <a:ext cx="165320" cy="113020"/>
         </a:xfrm>
         <a:prstGeom prst="leftRightArrow">
@@ -7028,7 +7028,7 @@
         </a:p>
       </dsp:txBody>
       <dsp:txXfrm>
-        <a:off x="1113923" y="589585"/>
+        <a:off x="1113923" y="589584"/>
         <a:ext cx="97508" cy="67812"/>
       </dsp:txXfrm>
     </dsp:sp>
@@ -7039,7 +7039,7 @@
       </dsp:nvSpPr>
       <dsp:spPr>
         <a:xfrm>
-          <a:off x="999439" y="923734"/>
+          <a:off x="999439" y="923733"/>
           <a:ext cx="859603" cy="322916"/>
         </a:xfrm>
         <a:prstGeom prst="roundRect">
@@ -7103,7 +7103,7 @@
         </a:p>
       </dsp:txBody>
       <dsp:txXfrm>
-        <a:off x="1008897" y="933192"/>
+        <a:off x="1008897" y="933191"/>
         <a:ext cx="840687" cy="304000"/>
       </dsp:txXfrm>
     </dsp:sp>
@@ -7114,7 +7114,7 @@
       </dsp:nvSpPr>
       <dsp:spPr>
         <a:xfrm rot="10800004">
-          <a:off x="813454" y="1028681"/>
+          <a:off x="813454" y="1028680"/>
           <a:ext cx="165320" cy="113020"/>
         </a:xfrm>
         <a:prstGeom prst="leftRightArrow">
@@ -7173,7 +7173,7 @@
         </a:p>
       </dsp:txBody>
       <dsp:txXfrm rot="10800000">
-        <a:off x="847360" y="1051285"/>
+        <a:off x="847360" y="1051284"/>
         <a:ext cx="97508" cy="67812"/>
       </dsp:txXfrm>
     </dsp:sp>
@@ -7184,7 +7184,7 @@
       </dsp:nvSpPr>
       <dsp:spPr>
         <a:xfrm>
-          <a:off x="-66814" y="923733"/>
+          <a:off x="-66813" y="923732"/>
           <a:ext cx="859603" cy="322916"/>
         </a:xfrm>
         <a:prstGeom prst="roundRect">
@@ -7248,7 +7248,7 @@
         </a:p>
       </dsp:txBody>
       <dsp:txXfrm>
-        <a:off x="-57356" y="933191"/>
+        <a:off x="-57355" y="933190"/>
         <a:ext cx="840687" cy="304000"/>
       </dsp:txXfrm>
     </dsp:sp>
@@ -7259,7 +7259,7 @@
       </dsp:nvSpPr>
       <dsp:spPr>
         <a:xfrm rot="18000004">
-          <a:off x="546890" y="566980"/>
+          <a:off x="546891" y="566980"/>
           <a:ext cx="165320" cy="113020"/>
         </a:xfrm>
         <a:prstGeom prst="leftRightArrow">
@@ -7318,7 +7318,7 @@
         </a:p>
       </dsp:txBody>
       <dsp:txXfrm>
-        <a:off x="580796" y="589584"/>
+        <a:off x="580797" y="589584"/>
         <a:ext cx="97508" cy="67812"/>
       </dsp:txXfrm>
     </dsp:sp>
@@ -13263,7 +13263,7 @@
           <a:p>
             <a:fld id="{BA7260D0-849A-4929-84D5-3C9AAB51EEEF}" type="datetimeFigureOut">
               <a:rPr lang="en-US" smtClean="0"/>
-              <a:t>12/19/2023</a:t>
+              <a:t>12/20/2023</a:t>
             </a:fld>
             <a:endParaRPr lang="en-US"/>
           </a:p>
@@ -13441,7 +13441,7 @@
           <a:p>
             <a:fld id="{F69E9857-B11D-4C38-9933-1D42B7690C73}" type="datetimeFigureOut">
               <a:rPr lang="en-US" smtClean="0"/>
-              <a:t>12/19/2023</a:t>
+              <a:t>12/20/2023</a:t>
             </a:fld>
             <a:endParaRPr lang="en-US"/>
           </a:p>
@@ -13838,9 +13838,9 @@
           <a:bodyPr/>
           <a:lstStyle/>
           <a:p>
-            <a:fld id="{86C46DB3-62BE-42C5-87DD-9EAC7B0B7223}" type="datetime1">
+            <a:fld id="{F4A859AB-1F0C-4A6F-AD5E-65B587B44EE5}" type="datetime1">
               <a:rPr lang="en-US" smtClean="0"/>
-              <a:t>12/19/2023</a:t>
+              <a:t>12/20/2023</a:t>
             </a:fld>
             <a:endParaRPr lang="en-US"/>
           </a:p>
@@ -13861,7 +13861,10 @@
           <a:bodyPr/>
           <a:lstStyle/>
           <a:p>
-            <a:endParaRPr lang="en-US"/>
+            <a:r>
+              <a:rPr lang="en-US"/>
+              <a:t>20 December 2023</a:t>
+            </a:r>
           </a:p>
         </p:txBody>
       </p:sp>
@@ -14008,9 +14011,9 @@
           <a:bodyPr/>
           <a:lstStyle/>
           <a:p>
-            <a:fld id="{C22F7420-6AD2-4EB8-90D7-89B6CDAE77C8}" type="datetime1">
+            <a:fld id="{D10EB1A5-DBC9-415D-85A4-89497BFF5550}" type="datetime1">
               <a:rPr lang="en-US" smtClean="0"/>
-              <a:t>12/19/2023</a:t>
+              <a:t>12/20/2023</a:t>
             </a:fld>
             <a:endParaRPr lang="en-US"/>
           </a:p>
@@ -14031,7 +14034,10 @@
           <a:bodyPr/>
           <a:lstStyle/>
           <a:p>
-            <a:endParaRPr lang="en-US"/>
+            <a:r>
+              <a:rPr lang="en-US"/>
+              <a:t>20 December 2023</a:t>
+            </a:r>
           </a:p>
         </p:txBody>
       </p:sp>
@@ -14188,9 +14194,9 @@
           <a:bodyPr/>
           <a:lstStyle/>
           <a:p>
-            <a:fld id="{C8CA8A7C-CDA7-49C1-B291-12F247761B0E}" type="datetime1">
+            <a:fld id="{9C8F161C-D0E1-43D0-B5A6-F83A9D669E72}" type="datetime1">
               <a:rPr lang="en-US" smtClean="0"/>
-              <a:t>12/19/2023</a:t>
+              <a:t>12/20/2023</a:t>
             </a:fld>
             <a:endParaRPr lang="en-US"/>
           </a:p>
@@ -14211,7 +14217,10 @@
           <a:bodyPr/>
           <a:lstStyle/>
           <a:p>
-            <a:endParaRPr lang="en-US"/>
+            <a:r>
+              <a:rPr lang="en-US"/>
+              <a:t>20 December 2023</a:t>
+            </a:r>
           </a:p>
         </p:txBody>
       </p:sp>
@@ -14358,9 +14367,9 @@
           <a:bodyPr/>
           <a:lstStyle/>
           <a:p>
-            <a:fld id="{921D811D-683D-4D50-B393-A99D05890228}" type="datetime1">
+            <a:fld id="{09598ABC-0F9A-48E2-86A1-8F9CBF149A0D}" type="datetime1">
               <a:rPr lang="en-US" smtClean="0"/>
-              <a:t>12/19/2023</a:t>
+              <a:t>12/20/2023</a:t>
             </a:fld>
             <a:endParaRPr lang="en-US"/>
           </a:p>
@@ -14381,7 +14390,10 @@
           <a:bodyPr/>
           <a:lstStyle/>
           <a:p>
-            <a:endParaRPr lang="en-US"/>
+            <a:r>
+              <a:rPr lang="en-US"/>
+              <a:t>20 December 2023</a:t>
+            </a:r>
           </a:p>
         </p:txBody>
       </p:sp>
@@ -14602,9 +14614,9 @@
           <a:bodyPr/>
           <a:lstStyle/>
           <a:p>
-            <a:fld id="{F84C6029-B900-4DE6-A3AA-930D7E2F06A7}" type="datetime1">
+            <a:fld id="{06DC9144-1A9B-4643-BB1D-1F8ED6D40E3B}" type="datetime1">
               <a:rPr lang="en-US" smtClean="0"/>
-              <a:t>12/19/2023</a:t>
+              <a:t>12/20/2023</a:t>
             </a:fld>
             <a:endParaRPr lang="en-US"/>
           </a:p>
@@ -14625,7 +14637,10 @@
           <a:bodyPr/>
           <a:lstStyle/>
           <a:p>
-            <a:endParaRPr lang="en-US"/>
+            <a:r>
+              <a:rPr lang="en-US"/>
+              <a:t>20 December 2023</a:t>
+            </a:r>
           </a:p>
         </p:txBody>
       </p:sp>
@@ -14834,9 +14849,9 @@
           <a:bodyPr/>
           <a:lstStyle/>
           <a:p>
-            <a:fld id="{28EF7D81-D2D4-49B2-AEA3-728A58B73E75}" type="datetime1">
+            <a:fld id="{4FADF0DB-DC90-401A-93F9-A7922B4630A9}" type="datetime1">
               <a:rPr lang="en-US" smtClean="0"/>
-              <a:t>12/19/2023</a:t>
+              <a:t>12/20/2023</a:t>
             </a:fld>
             <a:endParaRPr lang="en-US"/>
           </a:p>
@@ -14857,7 +14872,10 @@
           <a:bodyPr/>
           <a:lstStyle/>
           <a:p>
-            <a:endParaRPr lang="en-US"/>
+            <a:r>
+              <a:rPr lang="en-US"/>
+              <a:t>20 December 2023</a:t>
+            </a:r>
           </a:p>
         </p:txBody>
       </p:sp>
@@ -15201,9 +15219,9 @@
           <a:bodyPr/>
           <a:lstStyle/>
           <a:p>
-            <a:fld id="{FB9F2479-F2EE-4031-9DC7-F2E0C45A22F1}" type="datetime1">
+            <a:fld id="{1DEDEC06-D58B-4811-B5C8-ADF0A3794498}" type="datetime1">
               <a:rPr lang="en-US" smtClean="0"/>
-              <a:t>12/19/2023</a:t>
+              <a:t>12/20/2023</a:t>
             </a:fld>
             <a:endParaRPr lang="en-US"/>
           </a:p>
@@ -15224,7 +15242,10 @@
           <a:bodyPr/>
           <a:lstStyle/>
           <a:p>
-            <a:endParaRPr lang="en-US"/>
+            <a:r>
+              <a:rPr lang="en-US"/>
+              <a:t>20 December 2023</a:t>
+            </a:r>
           </a:p>
         </p:txBody>
       </p:sp>
@@ -15319,9 +15340,9 @@
           <a:bodyPr/>
           <a:lstStyle/>
           <a:p>
-            <a:fld id="{63285D1C-881A-4908-B423-D486B9C26C5F}" type="datetime1">
+            <a:fld id="{04D2B2E8-7FAD-43F0-A2D7-504D5D2957A9}" type="datetime1">
               <a:rPr lang="en-US" smtClean="0"/>
-              <a:t>12/19/2023</a:t>
+              <a:t>12/20/2023</a:t>
             </a:fld>
             <a:endParaRPr lang="en-US"/>
           </a:p>
@@ -15342,7 +15363,10 @@
           <a:bodyPr/>
           <a:lstStyle/>
           <a:p>
-            <a:endParaRPr lang="en-US"/>
+            <a:r>
+              <a:rPr lang="en-US"/>
+              <a:t>20 December 2023</a:t>
+            </a:r>
           </a:p>
         </p:txBody>
       </p:sp>
@@ -15414,9 +15438,9 @@
           <a:bodyPr/>
           <a:lstStyle/>
           <a:p>
-            <a:fld id="{59EEA2D7-AC37-4691-B4ED-D0505AA48F92}" type="datetime1">
+            <a:fld id="{CA6508C7-673D-401B-8922-AD0559E269AC}" type="datetime1">
               <a:rPr lang="en-US" smtClean="0"/>
-              <a:t>12/19/2023</a:t>
+              <a:t>12/20/2023</a:t>
             </a:fld>
             <a:endParaRPr lang="en-US"/>
           </a:p>
@@ -15437,7 +15461,10 @@
           <a:bodyPr/>
           <a:lstStyle/>
           <a:p>
-            <a:endParaRPr lang="en-US"/>
+            <a:r>
+              <a:rPr lang="en-US"/>
+              <a:t>20 December 2023</a:t>
+            </a:r>
           </a:p>
         </p:txBody>
       </p:sp>
@@ -15691,9 +15718,9 @@
           <a:bodyPr/>
           <a:lstStyle/>
           <a:p>
-            <a:fld id="{90585ACB-9EB3-45DC-B2B2-799C3483D86E}" type="datetime1">
+            <a:fld id="{C5ABE0F8-4DA6-44AA-A2BB-F83E89867EA2}" type="datetime1">
               <a:rPr lang="en-US" smtClean="0"/>
-              <a:t>12/19/2023</a:t>
+              <a:t>12/20/2023</a:t>
             </a:fld>
             <a:endParaRPr lang="en-US"/>
           </a:p>
@@ -15714,7 +15741,10 @@
           <a:bodyPr/>
           <a:lstStyle/>
           <a:p>
-            <a:endParaRPr lang="en-US"/>
+            <a:r>
+              <a:rPr lang="en-US"/>
+              <a:t>20 December 2023</a:t>
+            </a:r>
           </a:p>
         </p:txBody>
       </p:sp>
@@ -15948,9 +15978,9 @@
           <a:bodyPr/>
           <a:lstStyle/>
           <a:p>
-            <a:fld id="{FA5BDDF6-2461-4372-A4F6-F81C966AFC97}" type="datetime1">
+            <a:fld id="{05B4B605-27DD-40C9-9CA7-9E196DB4F463}" type="datetime1">
               <a:rPr lang="en-US" smtClean="0"/>
-              <a:t>12/19/2023</a:t>
+              <a:t>12/20/2023</a:t>
             </a:fld>
             <a:endParaRPr lang="en-US"/>
           </a:p>
@@ -15971,7 +16001,10 @@
           <a:bodyPr/>
           <a:lstStyle/>
           <a:p>
-            <a:endParaRPr lang="en-US"/>
+            <a:r>
+              <a:rPr lang="en-US"/>
+              <a:t>20 December 2023</a:t>
+            </a:r>
           </a:p>
         </p:txBody>
       </p:sp>
@@ -16161,9 +16194,9 @@
             </a:lvl1pPr>
           </a:lstStyle>
           <a:p>
-            <a:fld id="{CDC3AE9F-E337-4F06-A2EF-ECC0FF8348C3}" type="datetime1">
+            <a:fld id="{803E1758-7C78-42B3-96DE-E81F11C11E20}" type="datetime1">
               <a:rPr lang="en-US" smtClean="0"/>
-              <a:t>12/19/2023</a:t>
+              <a:t>12/20/2023</a:t>
             </a:fld>
             <a:endParaRPr lang="en-US"/>
           </a:p>
@@ -16202,7 +16235,10 @@
             </a:lvl1pPr>
           </a:lstStyle>
           <a:p>
-            <a:endParaRPr lang="en-US"/>
+            <a:r>
+              <a:rPr lang="en-US"/>
+              <a:t>20 December 2023</a:t>
+            </a:r>
           </a:p>
         </p:txBody>
       </p:sp>
@@ -17223,13 +17259,10 @@
           <a:p>
             <a:pPr algn="l"/>
             <a:r>
-              <a:rPr lang="en-US" dirty="0" err="1"/>
-              <a:t>ViMiGo</a:t>
+              <a:rPr lang="en-US"/>
+              <a:t>20 December 2023</a:t>
             </a:r>
-            <a:r>
-              <a:rPr lang="en-US" dirty="0"/>
-              <a:t> Writing Assessment – NASRUL ARIF BIN ZAKRIA</a:t>
-            </a:r>
+            <a:endParaRPr lang="en-US" dirty="0"/>
           </a:p>
         </p:txBody>
       </p:sp>
@@ -17613,6 +17646,272 @@
           </a:p>
         </p:txBody>
       </p:sp>
+      <p:sp>
+        <p:nvSpPr>
+          <p:cNvPr id="18" name="Footer Placeholder 8">
+            <a:extLst>
+              <a:ext uri="{FF2B5EF4-FFF2-40B4-BE49-F238E27FC236}">
+                <a16:creationId xmlns:a16="http://schemas.microsoft.com/office/drawing/2014/main" id="{68FE18E6-FB72-4CFB-AA30-A505E61D628C}"/>
+              </a:ext>
+            </a:extLst>
+          </p:cNvPr>
+          <p:cNvSpPr txBox="1">
+            <a:spLocks/>
+          </p:cNvSpPr>
+          <p:nvPr/>
+        </p:nvSpPr>
+        <p:spPr>
+          <a:xfrm>
+            <a:off x="4723876" y="182064"/>
+            <a:ext cx="4439174" cy="681567"/>
+          </a:xfrm>
+          <a:prstGeom prst="rect">
+            <a:avLst/>
+          </a:prstGeom>
+        </p:spPr>
+        <p:txBody>
+          <a:bodyPr vert="horz" lIns="91440" tIns="45720" rIns="91440" bIns="45720" rtlCol="0" anchor="ctr"/>
+          <a:lstStyle>
+            <a:defPPr>
+              <a:defRPr lang="en-US"/>
+            </a:defPPr>
+            <a:lvl1pPr marL="0" algn="ctr" defTabSz="457200" rtl="0" eaLnBrk="1" latinLnBrk="0" hangingPunct="1">
+              <a:defRPr sz="1260" kern="1200">
+                <a:solidFill>
+                  <a:schemeClr val="tx1">
+                    <a:tint val="75000"/>
+                  </a:schemeClr>
+                </a:solidFill>
+                <a:latin typeface="+mn-lt"/>
+                <a:ea typeface="+mn-ea"/>
+                <a:cs typeface="+mn-cs"/>
+              </a:defRPr>
+            </a:lvl1pPr>
+            <a:lvl2pPr marL="457200" algn="l" defTabSz="457200" rtl="0" eaLnBrk="1" latinLnBrk="0" hangingPunct="1">
+              <a:defRPr sz="1800" kern="1200">
+                <a:solidFill>
+                  <a:schemeClr val="tx1"/>
+                </a:solidFill>
+                <a:latin typeface="+mn-lt"/>
+                <a:ea typeface="+mn-ea"/>
+                <a:cs typeface="+mn-cs"/>
+              </a:defRPr>
+            </a:lvl2pPr>
+            <a:lvl3pPr marL="914400" algn="l" defTabSz="457200" rtl="0" eaLnBrk="1" latinLnBrk="0" hangingPunct="1">
+              <a:defRPr sz="1800" kern="1200">
+                <a:solidFill>
+                  <a:schemeClr val="tx1"/>
+                </a:solidFill>
+                <a:latin typeface="+mn-lt"/>
+                <a:ea typeface="+mn-ea"/>
+                <a:cs typeface="+mn-cs"/>
+              </a:defRPr>
+            </a:lvl3pPr>
+            <a:lvl4pPr marL="1371600" algn="l" defTabSz="457200" rtl="0" eaLnBrk="1" latinLnBrk="0" hangingPunct="1">
+              <a:defRPr sz="1800" kern="1200">
+                <a:solidFill>
+                  <a:schemeClr val="tx1"/>
+                </a:solidFill>
+                <a:latin typeface="+mn-lt"/>
+                <a:ea typeface="+mn-ea"/>
+                <a:cs typeface="+mn-cs"/>
+              </a:defRPr>
+            </a:lvl4pPr>
+            <a:lvl5pPr marL="1828800" algn="l" defTabSz="457200" rtl="0" eaLnBrk="1" latinLnBrk="0" hangingPunct="1">
+              <a:defRPr sz="1800" kern="1200">
+                <a:solidFill>
+                  <a:schemeClr val="tx1"/>
+                </a:solidFill>
+                <a:latin typeface="+mn-lt"/>
+                <a:ea typeface="+mn-ea"/>
+                <a:cs typeface="+mn-cs"/>
+              </a:defRPr>
+            </a:lvl5pPr>
+            <a:lvl6pPr marL="2286000" algn="l" defTabSz="457200" rtl="0" eaLnBrk="1" latinLnBrk="0" hangingPunct="1">
+              <a:defRPr sz="1800" kern="1200">
+                <a:solidFill>
+                  <a:schemeClr val="tx1"/>
+                </a:solidFill>
+                <a:latin typeface="+mn-lt"/>
+                <a:ea typeface="+mn-ea"/>
+                <a:cs typeface="+mn-cs"/>
+              </a:defRPr>
+            </a:lvl6pPr>
+            <a:lvl7pPr marL="2743200" algn="l" defTabSz="457200" rtl="0" eaLnBrk="1" latinLnBrk="0" hangingPunct="1">
+              <a:defRPr sz="1800" kern="1200">
+                <a:solidFill>
+                  <a:schemeClr val="tx1"/>
+                </a:solidFill>
+                <a:latin typeface="+mn-lt"/>
+                <a:ea typeface="+mn-ea"/>
+                <a:cs typeface="+mn-cs"/>
+              </a:defRPr>
+            </a:lvl7pPr>
+            <a:lvl8pPr marL="3200400" algn="l" defTabSz="457200" rtl="0" eaLnBrk="1" latinLnBrk="0" hangingPunct="1">
+              <a:defRPr sz="1800" kern="1200">
+                <a:solidFill>
+                  <a:schemeClr val="tx1"/>
+                </a:solidFill>
+                <a:latin typeface="+mn-lt"/>
+                <a:ea typeface="+mn-ea"/>
+                <a:cs typeface="+mn-cs"/>
+              </a:defRPr>
+            </a:lvl8pPr>
+            <a:lvl9pPr marL="3657600" algn="l" defTabSz="457200" rtl="0" eaLnBrk="1" latinLnBrk="0" hangingPunct="1">
+              <a:defRPr sz="1800" kern="1200">
+                <a:solidFill>
+                  <a:schemeClr val="tx1"/>
+                </a:solidFill>
+                <a:latin typeface="+mn-lt"/>
+                <a:ea typeface="+mn-ea"/>
+                <a:cs typeface="+mn-cs"/>
+              </a:defRPr>
+            </a:lvl9pPr>
+          </a:lstStyle>
+          <a:p>
+            <a:pPr algn="r"/>
+            <a:r>
+              <a:rPr lang="en-US" dirty="0" err="1"/>
+              <a:t>ViMiGo</a:t>
+            </a:r>
+            <a:r>
+              <a:rPr lang="en-US" dirty="0"/>
+              <a:t> Writing Assessment – NASRUL ARIF BIN ZAKRIA</a:t>
+            </a:r>
+          </a:p>
+        </p:txBody>
+      </p:sp>
+      <p:sp>
+        <p:nvSpPr>
+          <p:cNvPr id="19" name="Footer Placeholder 8">
+            <a:extLst>
+              <a:ext uri="{FF2B5EF4-FFF2-40B4-BE49-F238E27FC236}">
+                <a16:creationId xmlns:a16="http://schemas.microsoft.com/office/drawing/2014/main" id="{FF5227FC-0198-4A4D-B229-7F39533615F2}"/>
+              </a:ext>
+            </a:extLst>
+          </p:cNvPr>
+          <p:cNvSpPr txBox="1">
+            <a:spLocks/>
+          </p:cNvSpPr>
+          <p:nvPr/>
+        </p:nvSpPr>
+        <p:spPr>
+          <a:xfrm>
+            <a:off x="878690" y="180843"/>
+            <a:ext cx="4439174" cy="681567"/>
+          </a:xfrm>
+          <a:prstGeom prst="rect">
+            <a:avLst/>
+          </a:prstGeom>
+        </p:spPr>
+        <p:txBody>
+          <a:bodyPr vert="horz" lIns="91440" tIns="45720" rIns="91440" bIns="45720" rtlCol="0" anchor="ctr"/>
+          <a:lstStyle>
+            <a:defPPr>
+              <a:defRPr lang="en-US"/>
+            </a:defPPr>
+            <a:lvl1pPr marL="0" algn="ctr" defTabSz="457200" rtl="0" eaLnBrk="1" latinLnBrk="0" hangingPunct="1">
+              <a:defRPr sz="1260" kern="1200">
+                <a:solidFill>
+                  <a:schemeClr val="tx1">
+                    <a:tint val="75000"/>
+                  </a:schemeClr>
+                </a:solidFill>
+                <a:latin typeface="+mn-lt"/>
+                <a:ea typeface="+mn-ea"/>
+                <a:cs typeface="+mn-cs"/>
+              </a:defRPr>
+            </a:lvl1pPr>
+            <a:lvl2pPr marL="457200" algn="l" defTabSz="457200" rtl="0" eaLnBrk="1" latinLnBrk="0" hangingPunct="1">
+              <a:defRPr sz="1800" kern="1200">
+                <a:solidFill>
+                  <a:schemeClr val="tx1"/>
+                </a:solidFill>
+                <a:latin typeface="+mn-lt"/>
+                <a:ea typeface="+mn-ea"/>
+                <a:cs typeface="+mn-cs"/>
+              </a:defRPr>
+            </a:lvl2pPr>
+            <a:lvl3pPr marL="914400" algn="l" defTabSz="457200" rtl="0" eaLnBrk="1" latinLnBrk="0" hangingPunct="1">
+              <a:defRPr sz="1800" kern="1200">
+                <a:solidFill>
+                  <a:schemeClr val="tx1"/>
+                </a:solidFill>
+                <a:latin typeface="+mn-lt"/>
+                <a:ea typeface="+mn-ea"/>
+                <a:cs typeface="+mn-cs"/>
+              </a:defRPr>
+            </a:lvl3pPr>
+            <a:lvl4pPr marL="1371600" algn="l" defTabSz="457200" rtl="0" eaLnBrk="1" latinLnBrk="0" hangingPunct="1">
+              <a:defRPr sz="1800" kern="1200">
+                <a:solidFill>
+                  <a:schemeClr val="tx1"/>
+                </a:solidFill>
+                <a:latin typeface="+mn-lt"/>
+                <a:ea typeface="+mn-ea"/>
+                <a:cs typeface="+mn-cs"/>
+              </a:defRPr>
+            </a:lvl4pPr>
+            <a:lvl5pPr marL="1828800" algn="l" defTabSz="457200" rtl="0" eaLnBrk="1" latinLnBrk="0" hangingPunct="1">
+              <a:defRPr sz="1800" kern="1200">
+                <a:solidFill>
+                  <a:schemeClr val="tx1"/>
+                </a:solidFill>
+                <a:latin typeface="+mn-lt"/>
+                <a:ea typeface="+mn-ea"/>
+                <a:cs typeface="+mn-cs"/>
+              </a:defRPr>
+            </a:lvl5pPr>
+            <a:lvl6pPr marL="2286000" algn="l" defTabSz="457200" rtl="0" eaLnBrk="1" latinLnBrk="0" hangingPunct="1">
+              <a:defRPr sz="1800" kern="1200">
+                <a:solidFill>
+                  <a:schemeClr val="tx1"/>
+                </a:solidFill>
+                <a:latin typeface="+mn-lt"/>
+                <a:ea typeface="+mn-ea"/>
+                <a:cs typeface="+mn-cs"/>
+              </a:defRPr>
+            </a:lvl6pPr>
+            <a:lvl7pPr marL="2743200" algn="l" defTabSz="457200" rtl="0" eaLnBrk="1" latinLnBrk="0" hangingPunct="1">
+              <a:defRPr sz="1800" kern="1200">
+                <a:solidFill>
+                  <a:schemeClr val="tx1"/>
+                </a:solidFill>
+                <a:latin typeface="+mn-lt"/>
+                <a:ea typeface="+mn-ea"/>
+                <a:cs typeface="+mn-cs"/>
+              </a:defRPr>
+            </a:lvl7pPr>
+            <a:lvl8pPr marL="3200400" algn="l" defTabSz="457200" rtl="0" eaLnBrk="1" latinLnBrk="0" hangingPunct="1">
+              <a:defRPr sz="1800" kern="1200">
+                <a:solidFill>
+                  <a:schemeClr val="tx1"/>
+                </a:solidFill>
+                <a:latin typeface="+mn-lt"/>
+                <a:ea typeface="+mn-ea"/>
+                <a:cs typeface="+mn-cs"/>
+              </a:defRPr>
+            </a:lvl8pPr>
+            <a:lvl9pPr marL="3657600" algn="l" defTabSz="457200" rtl="0" eaLnBrk="1" latinLnBrk="0" hangingPunct="1">
+              <a:defRPr sz="1800" kern="1200">
+                <a:solidFill>
+                  <a:schemeClr val="tx1"/>
+                </a:solidFill>
+                <a:latin typeface="+mn-lt"/>
+                <a:ea typeface="+mn-ea"/>
+                <a:cs typeface="+mn-cs"/>
+              </a:defRPr>
+            </a:lvl9pPr>
+          </a:lstStyle>
+          <a:p>
+            <a:pPr algn="l"/>
+            <a:r>
+              <a:rPr lang="en-US" dirty="0"/>
+              <a:t>Migration: Monolithic to Microservices</a:t>
+            </a:r>
+          </a:p>
+        </p:txBody>
+      </p:sp>
     </p:spTree>
     <p:extLst>
       <p:ext uri="{BB962C8B-B14F-4D97-AF65-F5344CB8AC3E}">
@@ -17688,7 +17987,7 @@
           <a:p>
             <a:r>
               <a:rPr lang="en-US" sz="2000" b="1" u="sng" dirty="0"/>
-              <a:t>MIGRATION: MONOLITHIC TO MICROSERVICES – POSSIBLE PROBLEMS </a:t>
+              <a:t>POSSIBLE PROBLEMS </a:t>
             </a:r>
           </a:p>
         </p:txBody>
@@ -17724,7 +18023,7 @@
             <a:pPr algn="just"/>
             <a:r>
               <a:rPr lang="en-US" sz="1600" dirty="0"/>
-              <a:t>When comparing monolithic architecture with microservices architecture, microservices obviously provide more advantages for large scale system with many users. However, we cannot deny that nothing is perfect, so does Microservices. </a:t>
+              <a:t>When comparing monolithic architecture with microservices architecture, microservices will provide more advantages for large scale system with many users. However, we cannot deny that nothing is perfect, so does Microservices. </a:t>
             </a:r>
             <a:r>
               <a:rPr lang="en-US" sz="1600" b="1" i="1" dirty="0"/>
@@ -17765,13 +18064,10 @@
           <a:p>
             <a:pPr algn="l"/>
             <a:r>
-              <a:rPr lang="en-US" dirty="0" err="1"/>
-              <a:t>ViMiGo</a:t>
+              <a:rPr lang="en-US"/>
+              <a:t>20 December 2023</a:t>
             </a:r>
-            <a:r>
-              <a:rPr lang="en-US" dirty="0"/>
-              <a:t> Writing Assessment – NASRUL ARIF BIN ZAKRIA</a:t>
-            </a:r>
+            <a:endParaRPr lang="en-US" dirty="0"/>
           </a:p>
         </p:txBody>
       </p:sp>
@@ -17819,13 +18115,13 @@
           <p:nvPr>
             <p:extLst>
               <p:ext uri="{D42A27DB-BD31-4B8C-83A1-F6EECF244321}">
-                <p14:modId xmlns:p14="http://schemas.microsoft.com/office/powerpoint/2010/main" val="808862460"/>
+                <p14:modId xmlns:p14="http://schemas.microsoft.com/office/powerpoint/2010/main" val="1884654153"/>
               </p:ext>
             </p:extLst>
           </p:nvPr>
         </p:nvGraphicFramePr>
         <p:xfrm>
-          <a:off x="858539" y="2467686"/>
+          <a:off x="858539" y="2322546"/>
           <a:ext cx="8082258" cy="2168118"/>
         </p:xfrm>
         <a:graphic>
@@ -18055,7 +18351,7 @@
         </p:nvSpPr>
         <p:spPr>
           <a:xfrm>
-            <a:off x="1805764" y="4810399"/>
+            <a:off x="1805764" y="4534628"/>
             <a:ext cx="5989673" cy="338554"/>
           </a:xfrm>
           <a:prstGeom prst="rect">
@@ -18094,7 +18390,7 @@
         </p:nvCxnSpPr>
         <p:spPr>
           <a:xfrm>
-            <a:off x="438150" y="5384800"/>
+            <a:off x="438150" y="4931244"/>
             <a:ext cx="8724900" cy="0"/>
           </a:xfrm>
           <a:prstGeom prst="line">
@@ -18137,7 +18433,7 @@
         </p:nvSpPr>
         <p:spPr>
           <a:xfrm>
-            <a:off x="858539" y="5620648"/>
+            <a:off x="858539" y="5028684"/>
             <a:ext cx="8082257" cy="400110"/>
           </a:xfrm>
           <a:prstGeom prst="rect">
@@ -18153,7 +18449,7 @@
           <a:p>
             <a:r>
               <a:rPr lang="en-US" sz="2000" b="1" u="sng" dirty="0"/>
-              <a:t>MIGRATION: MONOLITHIC TO MICROSERVICES – THE STEPS</a:t>
+              <a:t>THE STEPS</a:t>
             </a:r>
           </a:p>
         </p:txBody>
@@ -18172,7 +18468,7 @@
         </p:nvSpPr>
         <p:spPr>
           <a:xfrm>
-            <a:off x="858539" y="6160835"/>
+            <a:off x="858539" y="5490199"/>
             <a:ext cx="8082259" cy="584775"/>
           </a:xfrm>
           <a:prstGeom prst="rect">
@@ -18208,8 +18504,8 @@
         </p:nvGrpSpPr>
         <p:grpSpPr>
           <a:xfrm>
-            <a:off x="2990779" y="7607300"/>
-            <a:ext cx="878702" cy="1761441"/>
+            <a:off x="2588143" y="7052741"/>
+            <a:ext cx="1281338" cy="1633405"/>
             <a:chOff x="1684493" y="7029892"/>
             <a:chExt cx="1122396" cy="2249949"/>
           </a:xfrm>
@@ -18309,7 +18605,7 @@
         </p:nvSpPr>
         <p:spPr>
           <a:xfrm>
-            <a:off x="4376346" y="8185112"/>
+            <a:off x="4376346" y="7502517"/>
             <a:ext cx="1006640" cy="929500"/>
           </a:xfrm>
           <a:prstGeom prst="stripedRightArrow">
@@ -18357,13 +18653,13 @@
           <p:nvPr>
             <p:extLst>
               <p:ext uri="{D42A27DB-BD31-4B8C-83A1-F6EECF244321}">
-                <p14:modId xmlns:p14="http://schemas.microsoft.com/office/powerpoint/2010/main" val="990160715"/>
+                <p14:modId xmlns:p14="http://schemas.microsoft.com/office/powerpoint/2010/main" val="2443566145"/>
               </p:ext>
             </p:extLst>
           </p:nvPr>
         </p:nvGraphicFramePr>
         <p:xfrm>
-          <a:off x="5334769" y="8015013"/>
+          <a:off x="5334769" y="7332418"/>
           <a:ext cx="1836420" cy="1269697"/>
         </p:xfrm>
         <a:graphic>
@@ -18386,8 +18682,8 @@
         </p:nvSpPr>
         <p:spPr>
           <a:xfrm>
-            <a:off x="858538" y="6842366"/>
-            <a:ext cx="8304512" cy="3139321"/>
+            <a:off x="858538" y="6074813"/>
+            <a:ext cx="8304512" cy="5909310"/>
           </a:xfrm>
           <a:prstGeom prst="rect">
             <a:avLst/>
@@ -18413,7 +18709,15 @@
             </a:br>
             <a:r>
               <a:rPr lang="en-US" sz="1800" dirty="0"/>
-              <a:t>Existing monolithic system must be first identified and disintegrated into individual services.</a:t>
+              <a:t>Existing monolithic system must be first identified and disintegrated into individual services as shown in </a:t>
+            </a:r>
+            <a:r>
+              <a:rPr lang="en-US" sz="1800" b="1" i="1" dirty="0"/>
+              <a:t>Figure 1.1</a:t>
+            </a:r>
+            <a:r>
+              <a:rPr lang="en-US" sz="1800" dirty="0"/>
+              <a:t>.</a:t>
             </a:r>
             <a:endParaRPr lang="en-US" b="1" dirty="0"/>
           </a:p>
@@ -18475,6 +18779,43 @@
               <a:rPr lang="en-US" sz="1800" b="1" dirty="0"/>
               <a:t>Identify each services data flows and relationships.</a:t>
             </a:r>
+            <a:br>
+              <a:rPr lang="en-US" sz="1800" b="1" dirty="0"/>
+            </a:br>
+            <a:br>
+              <a:rPr lang="en-US" sz="1800" b="1" dirty="0"/>
+            </a:br>
+            <a:br>
+              <a:rPr lang="en-US" sz="1800" b="1" dirty="0"/>
+            </a:br>
+            <a:br>
+              <a:rPr lang="en-US" sz="1800" b="1" dirty="0"/>
+            </a:br>
+            <a:br>
+              <a:rPr lang="en-US" sz="1800" b="1" dirty="0"/>
+            </a:br>
+            <a:br>
+              <a:rPr lang="en-US" sz="1800" b="1" dirty="0"/>
+            </a:br>
+            <a:br>
+              <a:rPr lang="en-US" sz="1800" b="1" dirty="0"/>
+            </a:br>
+            <a:br>
+              <a:rPr lang="en-US" sz="1800" b="1" dirty="0"/>
+            </a:br>
+            <a:r>
+              <a:rPr lang="en-US" dirty="0"/>
+              <a:t>Once services has been disintegrated, databases for each services must be then identified. This require a precise data flows and relationships analysis among services outlined as depicted in </a:t>
+            </a:r>
+            <a:r>
+              <a:rPr lang="en-US" b="1" i="1" dirty="0"/>
+              <a:t>Figure 1.2</a:t>
+            </a:r>
+            <a:r>
+              <a:rPr lang="en-US" dirty="0"/>
+              <a:t>.</a:t>
+            </a:r>
+            <a:endParaRPr lang="en-US" sz="1800" b="1" dirty="0"/>
           </a:p>
         </p:txBody>
       </p:sp>
@@ -18492,7 +18833,7 @@
         </p:nvGrpSpPr>
         <p:grpSpPr>
           <a:xfrm>
-            <a:off x="2914903" y="10201566"/>
+            <a:off x="2914903" y="9415179"/>
             <a:ext cx="2922886" cy="1472243"/>
             <a:chOff x="246434" y="2334249"/>
             <a:chExt cx="11718588" cy="5902595"/>
@@ -18884,7 +19225,7 @@
         </p:nvSpPr>
         <p:spPr>
           <a:xfrm>
-            <a:off x="6890302" y="8260364"/>
+            <a:off x="6890302" y="7577769"/>
             <a:ext cx="1941362" cy="830997"/>
           </a:xfrm>
           <a:prstGeom prst="rect">
@@ -18920,7 +19261,7 @@
         </p:nvSpPr>
         <p:spPr>
           <a:xfrm>
-            <a:off x="7091518" y="10359686"/>
+            <a:off x="7091518" y="9573299"/>
             <a:ext cx="1538930" cy="830997"/>
           </a:xfrm>
           <a:prstGeom prst="rect">
@@ -18938,6 +19279,272 @@
             <a:r>
               <a:rPr lang="en-US" sz="1600" b="1" dirty="0"/>
               <a:t>Figure 1.2 – Data Flows and Relationships</a:t>
+            </a:r>
+          </a:p>
+        </p:txBody>
+      </p:sp>
+      <p:sp>
+        <p:nvSpPr>
+          <p:cNvPr id="34" name="Footer Placeholder 8">
+            <a:extLst>
+              <a:ext uri="{FF2B5EF4-FFF2-40B4-BE49-F238E27FC236}">
+                <a16:creationId xmlns:a16="http://schemas.microsoft.com/office/drawing/2014/main" id="{424E8F08-3D55-4AB7-A084-A563FF7159A4}"/>
+              </a:ext>
+            </a:extLst>
+          </p:cNvPr>
+          <p:cNvSpPr txBox="1">
+            <a:spLocks/>
+          </p:cNvSpPr>
+          <p:nvPr/>
+        </p:nvSpPr>
+        <p:spPr>
+          <a:xfrm>
+            <a:off x="4723876" y="182064"/>
+            <a:ext cx="4439174" cy="681567"/>
+          </a:xfrm>
+          <a:prstGeom prst="rect">
+            <a:avLst/>
+          </a:prstGeom>
+        </p:spPr>
+        <p:txBody>
+          <a:bodyPr vert="horz" lIns="91440" tIns="45720" rIns="91440" bIns="45720" rtlCol="0" anchor="ctr"/>
+          <a:lstStyle>
+            <a:defPPr>
+              <a:defRPr lang="en-US"/>
+            </a:defPPr>
+            <a:lvl1pPr marL="0" algn="ctr" defTabSz="457200" rtl="0" eaLnBrk="1" latinLnBrk="0" hangingPunct="1">
+              <a:defRPr sz="1260" kern="1200">
+                <a:solidFill>
+                  <a:schemeClr val="tx1">
+                    <a:tint val="75000"/>
+                  </a:schemeClr>
+                </a:solidFill>
+                <a:latin typeface="+mn-lt"/>
+                <a:ea typeface="+mn-ea"/>
+                <a:cs typeface="+mn-cs"/>
+              </a:defRPr>
+            </a:lvl1pPr>
+            <a:lvl2pPr marL="457200" algn="l" defTabSz="457200" rtl="0" eaLnBrk="1" latinLnBrk="0" hangingPunct="1">
+              <a:defRPr sz="1800" kern="1200">
+                <a:solidFill>
+                  <a:schemeClr val="tx1"/>
+                </a:solidFill>
+                <a:latin typeface="+mn-lt"/>
+                <a:ea typeface="+mn-ea"/>
+                <a:cs typeface="+mn-cs"/>
+              </a:defRPr>
+            </a:lvl2pPr>
+            <a:lvl3pPr marL="914400" algn="l" defTabSz="457200" rtl="0" eaLnBrk="1" latinLnBrk="0" hangingPunct="1">
+              <a:defRPr sz="1800" kern="1200">
+                <a:solidFill>
+                  <a:schemeClr val="tx1"/>
+                </a:solidFill>
+                <a:latin typeface="+mn-lt"/>
+                <a:ea typeface="+mn-ea"/>
+                <a:cs typeface="+mn-cs"/>
+              </a:defRPr>
+            </a:lvl3pPr>
+            <a:lvl4pPr marL="1371600" algn="l" defTabSz="457200" rtl="0" eaLnBrk="1" latinLnBrk="0" hangingPunct="1">
+              <a:defRPr sz="1800" kern="1200">
+                <a:solidFill>
+                  <a:schemeClr val="tx1"/>
+                </a:solidFill>
+                <a:latin typeface="+mn-lt"/>
+                <a:ea typeface="+mn-ea"/>
+                <a:cs typeface="+mn-cs"/>
+              </a:defRPr>
+            </a:lvl4pPr>
+            <a:lvl5pPr marL="1828800" algn="l" defTabSz="457200" rtl="0" eaLnBrk="1" latinLnBrk="0" hangingPunct="1">
+              <a:defRPr sz="1800" kern="1200">
+                <a:solidFill>
+                  <a:schemeClr val="tx1"/>
+                </a:solidFill>
+                <a:latin typeface="+mn-lt"/>
+                <a:ea typeface="+mn-ea"/>
+                <a:cs typeface="+mn-cs"/>
+              </a:defRPr>
+            </a:lvl5pPr>
+            <a:lvl6pPr marL="2286000" algn="l" defTabSz="457200" rtl="0" eaLnBrk="1" latinLnBrk="0" hangingPunct="1">
+              <a:defRPr sz="1800" kern="1200">
+                <a:solidFill>
+                  <a:schemeClr val="tx1"/>
+                </a:solidFill>
+                <a:latin typeface="+mn-lt"/>
+                <a:ea typeface="+mn-ea"/>
+                <a:cs typeface="+mn-cs"/>
+              </a:defRPr>
+            </a:lvl6pPr>
+            <a:lvl7pPr marL="2743200" algn="l" defTabSz="457200" rtl="0" eaLnBrk="1" latinLnBrk="0" hangingPunct="1">
+              <a:defRPr sz="1800" kern="1200">
+                <a:solidFill>
+                  <a:schemeClr val="tx1"/>
+                </a:solidFill>
+                <a:latin typeface="+mn-lt"/>
+                <a:ea typeface="+mn-ea"/>
+                <a:cs typeface="+mn-cs"/>
+              </a:defRPr>
+            </a:lvl7pPr>
+            <a:lvl8pPr marL="3200400" algn="l" defTabSz="457200" rtl="0" eaLnBrk="1" latinLnBrk="0" hangingPunct="1">
+              <a:defRPr sz="1800" kern="1200">
+                <a:solidFill>
+                  <a:schemeClr val="tx1"/>
+                </a:solidFill>
+                <a:latin typeface="+mn-lt"/>
+                <a:ea typeface="+mn-ea"/>
+                <a:cs typeface="+mn-cs"/>
+              </a:defRPr>
+            </a:lvl8pPr>
+            <a:lvl9pPr marL="3657600" algn="l" defTabSz="457200" rtl="0" eaLnBrk="1" latinLnBrk="0" hangingPunct="1">
+              <a:defRPr sz="1800" kern="1200">
+                <a:solidFill>
+                  <a:schemeClr val="tx1"/>
+                </a:solidFill>
+                <a:latin typeface="+mn-lt"/>
+                <a:ea typeface="+mn-ea"/>
+                <a:cs typeface="+mn-cs"/>
+              </a:defRPr>
+            </a:lvl9pPr>
+          </a:lstStyle>
+          <a:p>
+            <a:pPr algn="r"/>
+            <a:r>
+              <a:rPr lang="en-US" dirty="0" err="1"/>
+              <a:t>ViMiGo</a:t>
+            </a:r>
+            <a:r>
+              <a:rPr lang="en-US" dirty="0"/>
+              <a:t> Writing Assessment – NASRUL ARIF BIN ZAKRIA</a:t>
+            </a:r>
+          </a:p>
+        </p:txBody>
+      </p:sp>
+      <p:sp>
+        <p:nvSpPr>
+          <p:cNvPr id="35" name="Footer Placeholder 8">
+            <a:extLst>
+              <a:ext uri="{FF2B5EF4-FFF2-40B4-BE49-F238E27FC236}">
+                <a16:creationId xmlns:a16="http://schemas.microsoft.com/office/drawing/2014/main" id="{925DBBC3-B976-4ADC-927F-E3CDF5C8FCD9}"/>
+              </a:ext>
+            </a:extLst>
+          </p:cNvPr>
+          <p:cNvSpPr txBox="1">
+            <a:spLocks/>
+          </p:cNvSpPr>
+          <p:nvPr/>
+        </p:nvSpPr>
+        <p:spPr>
+          <a:xfrm>
+            <a:off x="878690" y="180843"/>
+            <a:ext cx="4439174" cy="681567"/>
+          </a:xfrm>
+          <a:prstGeom prst="rect">
+            <a:avLst/>
+          </a:prstGeom>
+        </p:spPr>
+        <p:txBody>
+          <a:bodyPr vert="horz" lIns="91440" tIns="45720" rIns="91440" bIns="45720" rtlCol="0" anchor="ctr"/>
+          <a:lstStyle>
+            <a:defPPr>
+              <a:defRPr lang="en-US"/>
+            </a:defPPr>
+            <a:lvl1pPr marL="0" algn="ctr" defTabSz="457200" rtl="0" eaLnBrk="1" latinLnBrk="0" hangingPunct="1">
+              <a:defRPr sz="1260" kern="1200">
+                <a:solidFill>
+                  <a:schemeClr val="tx1">
+                    <a:tint val="75000"/>
+                  </a:schemeClr>
+                </a:solidFill>
+                <a:latin typeface="+mn-lt"/>
+                <a:ea typeface="+mn-ea"/>
+                <a:cs typeface="+mn-cs"/>
+              </a:defRPr>
+            </a:lvl1pPr>
+            <a:lvl2pPr marL="457200" algn="l" defTabSz="457200" rtl="0" eaLnBrk="1" latinLnBrk="0" hangingPunct="1">
+              <a:defRPr sz="1800" kern="1200">
+                <a:solidFill>
+                  <a:schemeClr val="tx1"/>
+                </a:solidFill>
+                <a:latin typeface="+mn-lt"/>
+                <a:ea typeface="+mn-ea"/>
+                <a:cs typeface="+mn-cs"/>
+              </a:defRPr>
+            </a:lvl2pPr>
+            <a:lvl3pPr marL="914400" algn="l" defTabSz="457200" rtl="0" eaLnBrk="1" latinLnBrk="0" hangingPunct="1">
+              <a:defRPr sz="1800" kern="1200">
+                <a:solidFill>
+                  <a:schemeClr val="tx1"/>
+                </a:solidFill>
+                <a:latin typeface="+mn-lt"/>
+                <a:ea typeface="+mn-ea"/>
+                <a:cs typeface="+mn-cs"/>
+              </a:defRPr>
+            </a:lvl3pPr>
+            <a:lvl4pPr marL="1371600" algn="l" defTabSz="457200" rtl="0" eaLnBrk="1" latinLnBrk="0" hangingPunct="1">
+              <a:defRPr sz="1800" kern="1200">
+                <a:solidFill>
+                  <a:schemeClr val="tx1"/>
+                </a:solidFill>
+                <a:latin typeface="+mn-lt"/>
+                <a:ea typeface="+mn-ea"/>
+                <a:cs typeface="+mn-cs"/>
+              </a:defRPr>
+            </a:lvl4pPr>
+            <a:lvl5pPr marL="1828800" algn="l" defTabSz="457200" rtl="0" eaLnBrk="1" latinLnBrk="0" hangingPunct="1">
+              <a:defRPr sz="1800" kern="1200">
+                <a:solidFill>
+                  <a:schemeClr val="tx1"/>
+                </a:solidFill>
+                <a:latin typeface="+mn-lt"/>
+                <a:ea typeface="+mn-ea"/>
+                <a:cs typeface="+mn-cs"/>
+              </a:defRPr>
+            </a:lvl5pPr>
+            <a:lvl6pPr marL="2286000" algn="l" defTabSz="457200" rtl="0" eaLnBrk="1" latinLnBrk="0" hangingPunct="1">
+              <a:defRPr sz="1800" kern="1200">
+                <a:solidFill>
+                  <a:schemeClr val="tx1"/>
+                </a:solidFill>
+                <a:latin typeface="+mn-lt"/>
+                <a:ea typeface="+mn-ea"/>
+                <a:cs typeface="+mn-cs"/>
+              </a:defRPr>
+            </a:lvl6pPr>
+            <a:lvl7pPr marL="2743200" algn="l" defTabSz="457200" rtl="0" eaLnBrk="1" latinLnBrk="0" hangingPunct="1">
+              <a:defRPr sz="1800" kern="1200">
+                <a:solidFill>
+                  <a:schemeClr val="tx1"/>
+                </a:solidFill>
+                <a:latin typeface="+mn-lt"/>
+                <a:ea typeface="+mn-ea"/>
+                <a:cs typeface="+mn-cs"/>
+              </a:defRPr>
+            </a:lvl7pPr>
+            <a:lvl8pPr marL="3200400" algn="l" defTabSz="457200" rtl="0" eaLnBrk="1" latinLnBrk="0" hangingPunct="1">
+              <a:defRPr sz="1800" kern="1200">
+                <a:solidFill>
+                  <a:schemeClr val="tx1"/>
+                </a:solidFill>
+                <a:latin typeface="+mn-lt"/>
+                <a:ea typeface="+mn-ea"/>
+                <a:cs typeface="+mn-cs"/>
+              </a:defRPr>
+            </a:lvl8pPr>
+            <a:lvl9pPr marL="3657600" algn="l" defTabSz="457200" rtl="0" eaLnBrk="1" latinLnBrk="0" hangingPunct="1">
+              <a:defRPr sz="1800" kern="1200">
+                <a:solidFill>
+                  <a:schemeClr val="tx1"/>
+                </a:solidFill>
+                <a:latin typeface="+mn-lt"/>
+                <a:ea typeface="+mn-ea"/>
+                <a:cs typeface="+mn-cs"/>
+              </a:defRPr>
+            </a:lvl9pPr>
+          </a:lstStyle>
+          <a:p>
+            <a:pPr algn="l"/>
+            <a:r>
+              <a:rPr lang="en-US" dirty="0"/>
+              <a:t>Migration: Monolithic to Microservices</a:t>
             </a:r>
           </a:p>
         </p:txBody>
@@ -19015,12 +19622,8 @@
           <a:p>
             <a:pPr algn="l"/>
             <a:r>
-              <a:rPr lang="en-US" dirty="0" err="1"/>
-              <a:t>ViMiGo</a:t>
-            </a:r>
-            <a:r>
               <a:rPr lang="en-US" dirty="0"/>
-              <a:t> Writing Assessment – NASRUL ARIF BIN ZAKRIA</a:t>
+              <a:t>20 December 2023</a:t>
             </a:r>
           </a:p>
         </p:txBody>
@@ -19069,7 +19672,7 @@
         <p:spPr>
           <a:xfrm>
             <a:off x="858538" y="254844"/>
-            <a:ext cx="8304512" cy="3970318"/>
+            <a:ext cx="8304512" cy="4801314"/>
           </a:xfrm>
           <a:prstGeom prst="rect">
             <a:avLst/>
@@ -19148,6 +19751,15 @@
             <a:br>
               <a:rPr lang="en-US" sz="1800" b="1" dirty="0"/>
             </a:br>
+            <a:br>
+              <a:rPr lang="en-US" sz="1800" b="1" dirty="0"/>
+            </a:br>
+            <a:br>
+              <a:rPr lang="en-US" sz="1800" b="1" dirty="0"/>
+            </a:br>
+            <a:br>
+              <a:rPr lang="en-US" sz="1800" b="1" dirty="0"/>
+            </a:br>
             <a:endParaRPr lang="en-US" sz="1800" b="1" dirty="0"/>
           </a:p>
           <a:p>
@@ -19162,525 +19774,546 @@
           </a:p>
         </p:txBody>
       </p:sp>
-      <p:sp>
-        <p:nvSpPr>
-          <p:cNvPr id="19" name="Flowchart: Magnetic Disk 18">
+      <p:grpSp>
+        <p:nvGrpSpPr>
+          <p:cNvPr id="2" name="Group 1">
             <a:extLst>
               <a:ext uri="{FF2B5EF4-FFF2-40B4-BE49-F238E27FC236}">
-                <a16:creationId xmlns:a16="http://schemas.microsoft.com/office/drawing/2014/main" id="{B4686DE5-0E8D-40F1-BC53-54656D46B9F6}"/>
+                <a16:creationId xmlns:a16="http://schemas.microsoft.com/office/drawing/2014/main" id="{F49BD038-7934-400D-ACFE-45BBDD70A5CB}"/>
               </a:ext>
             </a:extLst>
           </p:cNvPr>
-          <p:cNvSpPr/>
+          <p:cNvGrpSpPr/>
           <p:nvPr/>
-        </p:nvSpPr>
-        <p:spPr>
+        </p:nvGrpSpPr>
+        <p:grpSpPr>
           <a:xfrm>
             <a:off x="3098277" y="1315130"/>
-            <a:ext cx="1002694" cy="671805"/>
+            <a:ext cx="3161505" cy="2246815"/>
+            <a:chOff x="3098277" y="1315130"/>
+            <a:chExt cx="3161505" cy="2328260"/>
           </a:xfrm>
-          <a:prstGeom prst="flowChartMagneticDisk">
-            <a:avLst/>
-          </a:prstGeom>
-          <a:solidFill>
-            <a:srgbClr val="FFC000"/>
-          </a:solidFill>
-          <a:ln w="38100">
+        </p:grpSpPr>
+        <p:sp>
+          <p:nvSpPr>
+            <p:cNvPr id="19" name="Flowchart: Magnetic Disk 18">
+              <a:extLst>
+                <a:ext uri="{FF2B5EF4-FFF2-40B4-BE49-F238E27FC236}">
+                  <a16:creationId xmlns:a16="http://schemas.microsoft.com/office/drawing/2014/main" id="{B4686DE5-0E8D-40F1-BC53-54656D46B9F6}"/>
+                </a:ext>
+              </a:extLst>
+            </p:cNvPr>
+            <p:cNvSpPr/>
+            <p:nvPr/>
+          </p:nvSpPr>
+          <p:spPr>
+            <a:xfrm>
+              <a:off x="3098277" y="1315130"/>
+              <a:ext cx="1002694" cy="671805"/>
+            </a:xfrm>
+            <a:prstGeom prst="flowChartMagneticDisk">
+              <a:avLst/>
+            </a:prstGeom>
             <a:solidFill>
-              <a:schemeClr val="tx1"/>
+              <a:srgbClr val="FFC000"/>
             </a:solidFill>
-          </a:ln>
-        </p:spPr>
-        <p:style>
-          <a:lnRef idx="2">
-            <a:schemeClr val="accent1">
-              <a:shade val="50000"/>
-            </a:schemeClr>
-          </a:lnRef>
-          <a:fillRef idx="1">
-            <a:schemeClr val="accent1"/>
-          </a:fillRef>
-          <a:effectRef idx="0">
-            <a:schemeClr val="accent1"/>
-          </a:effectRef>
-          <a:fontRef idx="minor">
-            <a:schemeClr val="lt1"/>
-          </a:fontRef>
-        </p:style>
-        <p:txBody>
-          <a:bodyPr rtlCol="0" anchor="ctr"/>
-          <a:lstStyle/>
-          <a:p>
-            <a:pPr algn="ctr"/>
-            <a:r>
-              <a:rPr lang="en-US" sz="2000" dirty="0">
-                <a:solidFill>
-                  <a:sysClr val="windowText" lastClr="000000"/>
-                </a:solidFill>
-              </a:rPr>
-              <a:t>DB A</a:t>
-            </a:r>
-          </a:p>
-        </p:txBody>
-      </p:sp>
-      <p:sp>
-        <p:nvSpPr>
-          <p:cNvPr id="20" name="Flowchart: Magnetic Disk 19">
-            <a:extLst>
-              <a:ext uri="{FF2B5EF4-FFF2-40B4-BE49-F238E27FC236}">
-                <a16:creationId xmlns:a16="http://schemas.microsoft.com/office/drawing/2014/main" id="{E66CB009-475D-4BBD-A1AB-65D5D5C5B75F}"/>
-              </a:ext>
-            </a:extLst>
-          </p:cNvPr>
-          <p:cNvSpPr/>
-          <p:nvPr/>
-        </p:nvSpPr>
-        <p:spPr>
-          <a:xfrm>
-            <a:off x="3098277" y="2140013"/>
-            <a:ext cx="1002694" cy="671805"/>
-          </a:xfrm>
-          <a:prstGeom prst="flowChartMagneticDisk">
-            <a:avLst/>
-          </a:prstGeom>
-          <a:solidFill>
-            <a:srgbClr val="00B0F0"/>
-          </a:solidFill>
-          <a:ln w="38100">
+            <a:ln w="38100">
+              <a:solidFill>
+                <a:schemeClr val="tx1"/>
+              </a:solidFill>
+            </a:ln>
+          </p:spPr>
+          <p:style>
+            <a:lnRef idx="2">
+              <a:schemeClr val="accent1">
+                <a:shade val="50000"/>
+              </a:schemeClr>
+            </a:lnRef>
+            <a:fillRef idx="1">
+              <a:schemeClr val="accent1"/>
+            </a:fillRef>
+            <a:effectRef idx="0">
+              <a:schemeClr val="accent1"/>
+            </a:effectRef>
+            <a:fontRef idx="minor">
+              <a:schemeClr val="lt1"/>
+            </a:fontRef>
+          </p:style>
+          <p:txBody>
+            <a:bodyPr rtlCol="0" anchor="ctr"/>
+            <a:lstStyle/>
+            <a:p>
+              <a:pPr algn="ctr"/>
+              <a:r>
+                <a:rPr lang="en-US" sz="2000" dirty="0">
+                  <a:solidFill>
+                    <a:sysClr val="windowText" lastClr="000000"/>
+                  </a:solidFill>
+                </a:rPr>
+                <a:t>DB A</a:t>
+              </a:r>
+            </a:p>
+          </p:txBody>
+        </p:sp>
+        <p:sp>
+          <p:nvSpPr>
+            <p:cNvPr id="20" name="Flowchart: Magnetic Disk 19">
+              <a:extLst>
+                <a:ext uri="{FF2B5EF4-FFF2-40B4-BE49-F238E27FC236}">
+                  <a16:creationId xmlns:a16="http://schemas.microsoft.com/office/drawing/2014/main" id="{E66CB009-475D-4BBD-A1AB-65D5D5C5B75F}"/>
+                </a:ext>
+              </a:extLst>
+            </p:cNvPr>
+            <p:cNvSpPr/>
+            <p:nvPr/>
+          </p:nvSpPr>
+          <p:spPr>
+            <a:xfrm>
+              <a:off x="3098277" y="2140013"/>
+              <a:ext cx="1002694" cy="671805"/>
+            </a:xfrm>
+            <a:prstGeom prst="flowChartMagneticDisk">
+              <a:avLst/>
+            </a:prstGeom>
             <a:solidFill>
-              <a:schemeClr val="tx1"/>
+              <a:srgbClr val="00B0F0"/>
             </a:solidFill>
-          </a:ln>
-        </p:spPr>
-        <p:style>
-          <a:lnRef idx="2">
-            <a:schemeClr val="accent1">
-              <a:shade val="50000"/>
-            </a:schemeClr>
-          </a:lnRef>
-          <a:fillRef idx="1">
-            <a:schemeClr val="accent1"/>
-          </a:fillRef>
-          <a:effectRef idx="0">
-            <a:schemeClr val="accent1"/>
-          </a:effectRef>
-          <a:fontRef idx="minor">
-            <a:schemeClr val="lt1"/>
-          </a:fontRef>
-        </p:style>
-        <p:txBody>
-          <a:bodyPr rtlCol="0" anchor="ctr"/>
-          <a:lstStyle/>
-          <a:p>
-            <a:pPr algn="ctr"/>
-            <a:r>
-              <a:rPr lang="en-US" sz="2000" dirty="0">
-                <a:solidFill>
-                  <a:sysClr val="windowText" lastClr="000000"/>
-                </a:solidFill>
-              </a:rPr>
-              <a:t>DB B</a:t>
-            </a:r>
-          </a:p>
-        </p:txBody>
-      </p:sp>
-      <p:sp>
-        <p:nvSpPr>
-          <p:cNvPr id="22" name="Flowchart: Magnetic Disk 21">
-            <a:extLst>
-              <a:ext uri="{FF2B5EF4-FFF2-40B4-BE49-F238E27FC236}">
-                <a16:creationId xmlns:a16="http://schemas.microsoft.com/office/drawing/2014/main" id="{3FB3CD25-28B5-4925-A7C4-B8733FDB93CB}"/>
-              </a:ext>
-            </a:extLst>
-          </p:cNvPr>
-          <p:cNvSpPr/>
-          <p:nvPr/>
-        </p:nvSpPr>
-        <p:spPr>
-          <a:xfrm>
-            <a:off x="3098277" y="2971585"/>
-            <a:ext cx="1002694" cy="671805"/>
-          </a:xfrm>
-          <a:prstGeom prst="flowChartMagneticDisk">
-            <a:avLst/>
-          </a:prstGeom>
-          <a:solidFill>
-            <a:srgbClr val="FF0000"/>
-          </a:solidFill>
-          <a:ln w="38100">
+            <a:ln w="38100">
+              <a:solidFill>
+                <a:schemeClr val="tx1"/>
+              </a:solidFill>
+            </a:ln>
+          </p:spPr>
+          <p:style>
+            <a:lnRef idx="2">
+              <a:schemeClr val="accent1">
+                <a:shade val="50000"/>
+              </a:schemeClr>
+            </a:lnRef>
+            <a:fillRef idx="1">
+              <a:schemeClr val="accent1"/>
+            </a:fillRef>
+            <a:effectRef idx="0">
+              <a:schemeClr val="accent1"/>
+            </a:effectRef>
+            <a:fontRef idx="minor">
+              <a:schemeClr val="lt1"/>
+            </a:fontRef>
+          </p:style>
+          <p:txBody>
+            <a:bodyPr rtlCol="0" anchor="ctr"/>
+            <a:lstStyle/>
+            <a:p>
+              <a:pPr algn="ctr"/>
+              <a:r>
+                <a:rPr lang="en-US" sz="2000" dirty="0">
+                  <a:solidFill>
+                    <a:sysClr val="windowText" lastClr="000000"/>
+                  </a:solidFill>
+                </a:rPr>
+                <a:t>DB B</a:t>
+              </a:r>
+            </a:p>
+          </p:txBody>
+        </p:sp>
+        <p:sp>
+          <p:nvSpPr>
+            <p:cNvPr id="22" name="Flowchart: Magnetic Disk 21">
+              <a:extLst>
+                <a:ext uri="{FF2B5EF4-FFF2-40B4-BE49-F238E27FC236}">
+                  <a16:creationId xmlns:a16="http://schemas.microsoft.com/office/drawing/2014/main" id="{3FB3CD25-28B5-4925-A7C4-B8733FDB93CB}"/>
+                </a:ext>
+              </a:extLst>
+            </p:cNvPr>
+            <p:cNvSpPr/>
+            <p:nvPr/>
+          </p:nvSpPr>
+          <p:spPr>
+            <a:xfrm>
+              <a:off x="3098277" y="2971585"/>
+              <a:ext cx="1002694" cy="671805"/>
+            </a:xfrm>
+            <a:prstGeom prst="flowChartMagneticDisk">
+              <a:avLst/>
+            </a:prstGeom>
             <a:solidFill>
-              <a:schemeClr val="tx1"/>
+              <a:srgbClr val="FF0000"/>
             </a:solidFill>
-          </a:ln>
-        </p:spPr>
-        <p:style>
-          <a:lnRef idx="2">
-            <a:schemeClr val="accent1">
-              <a:shade val="50000"/>
-            </a:schemeClr>
-          </a:lnRef>
-          <a:fillRef idx="1">
-            <a:schemeClr val="accent1"/>
-          </a:fillRef>
-          <a:effectRef idx="0">
-            <a:schemeClr val="accent1"/>
-          </a:effectRef>
-          <a:fontRef idx="minor">
-            <a:schemeClr val="lt1"/>
-          </a:fontRef>
-        </p:style>
-        <p:txBody>
-          <a:bodyPr rtlCol="0" anchor="ctr"/>
-          <a:lstStyle/>
-          <a:p>
-            <a:pPr algn="ctr"/>
-            <a:r>
-              <a:rPr lang="en-US" sz="2000" dirty="0">
-                <a:solidFill>
-                  <a:sysClr val="windowText" lastClr="000000"/>
-                </a:solidFill>
-              </a:rPr>
-              <a:t>DB C</a:t>
-            </a:r>
-          </a:p>
-        </p:txBody>
-      </p:sp>
-      <p:sp>
-        <p:nvSpPr>
-          <p:cNvPr id="23" name="Arrow: Striped Right 22">
-            <a:extLst>
-              <a:ext uri="{FF2B5EF4-FFF2-40B4-BE49-F238E27FC236}">
-                <a16:creationId xmlns:a16="http://schemas.microsoft.com/office/drawing/2014/main" id="{CAC61167-D756-4AF4-8780-C432AF421D73}"/>
-              </a:ext>
-            </a:extLst>
-          </p:cNvPr>
-          <p:cNvSpPr/>
-          <p:nvPr/>
-        </p:nvSpPr>
-        <p:spPr>
-          <a:xfrm>
-            <a:off x="4298338" y="1481980"/>
-            <a:ext cx="682589" cy="338105"/>
-          </a:xfrm>
-          <a:prstGeom prst="stripedRightArrow">
-            <a:avLst/>
-          </a:prstGeom>
-          <a:solidFill>
-            <a:srgbClr val="00B050"/>
-          </a:solidFill>
-          <a:ln>
-            <a:noFill/>
-          </a:ln>
-        </p:spPr>
-        <p:style>
-          <a:lnRef idx="2">
-            <a:schemeClr val="accent1">
-              <a:shade val="50000"/>
-            </a:schemeClr>
-          </a:lnRef>
-          <a:fillRef idx="1">
-            <a:schemeClr val="accent1"/>
-          </a:fillRef>
-          <a:effectRef idx="0">
-            <a:schemeClr val="accent1"/>
-          </a:effectRef>
-          <a:fontRef idx="minor">
-            <a:schemeClr val="lt1"/>
-          </a:fontRef>
-        </p:style>
-        <p:txBody>
-          <a:bodyPr rtlCol="0" anchor="ctr"/>
-          <a:lstStyle/>
-          <a:p>
-            <a:pPr algn="ctr"/>
-            <a:endParaRPr lang="en-US" sz="1100"/>
-          </a:p>
-        </p:txBody>
-      </p:sp>
-      <p:sp>
-        <p:nvSpPr>
-          <p:cNvPr id="24" name="Oval 23">
-            <a:extLst>
-              <a:ext uri="{FF2B5EF4-FFF2-40B4-BE49-F238E27FC236}">
-                <a16:creationId xmlns:a16="http://schemas.microsoft.com/office/drawing/2014/main" id="{E7F5DDC8-412F-426A-9B36-3063369907D8}"/>
-              </a:ext>
-            </a:extLst>
-          </p:cNvPr>
-          <p:cNvSpPr/>
-          <p:nvPr/>
-        </p:nvSpPr>
-        <p:spPr>
-          <a:xfrm>
-            <a:off x="5136073" y="1358138"/>
-            <a:ext cx="1123709" cy="585788"/>
-          </a:xfrm>
-          <a:prstGeom prst="ellipse">
-            <a:avLst/>
-          </a:prstGeom>
-          <a:solidFill>
-            <a:srgbClr val="FFFF00"/>
-          </a:solidFill>
-          <a:ln>
-            <a:noFill/>
-          </a:ln>
-        </p:spPr>
-        <p:style>
-          <a:lnRef idx="2">
-            <a:schemeClr val="accent1">
-              <a:shade val="50000"/>
-            </a:schemeClr>
-          </a:lnRef>
-          <a:fillRef idx="1">
-            <a:schemeClr val="accent1"/>
-          </a:fillRef>
-          <a:effectRef idx="0">
-            <a:schemeClr val="accent1"/>
-          </a:effectRef>
-          <a:fontRef idx="minor">
-            <a:schemeClr val="lt1"/>
-          </a:fontRef>
-        </p:style>
-        <p:txBody>
-          <a:bodyPr rtlCol="0" anchor="ctr"/>
-          <a:lstStyle/>
-          <a:p>
-            <a:pPr algn="ctr"/>
-            <a:r>
-              <a:rPr lang="en-US" sz="2400" b="1" dirty="0">
-                <a:solidFill>
-                  <a:sysClr val="windowText" lastClr="000000"/>
-                </a:solidFill>
-              </a:rPr>
-              <a:t>API</a:t>
-            </a:r>
-          </a:p>
-        </p:txBody>
-      </p:sp>
-      <p:sp>
-        <p:nvSpPr>
-          <p:cNvPr id="25" name="Arrow: Striped Right 24">
-            <a:extLst>
-              <a:ext uri="{FF2B5EF4-FFF2-40B4-BE49-F238E27FC236}">
-                <a16:creationId xmlns:a16="http://schemas.microsoft.com/office/drawing/2014/main" id="{D5AB0F49-D7D6-4139-AB8A-CB4403FE8242}"/>
-              </a:ext>
-            </a:extLst>
-          </p:cNvPr>
-          <p:cNvSpPr/>
-          <p:nvPr/>
-        </p:nvSpPr>
-        <p:spPr>
-          <a:xfrm>
-            <a:off x="4298338" y="2297970"/>
-            <a:ext cx="682589" cy="338105"/>
-          </a:xfrm>
-          <a:prstGeom prst="stripedRightArrow">
-            <a:avLst/>
-          </a:prstGeom>
-          <a:solidFill>
-            <a:srgbClr val="00B050"/>
-          </a:solidFill>
-          <a:ln>
-            <a:noFill/>
-          </a:ln>
-        </p:spPr>
-        <p:style>
-          <a:lnRef idx="2">
-            <a:schemeClr val="accent1">
-              <a:shade val="50000"/>
-            </a:schemeClr>
-          </a:lnRef>
-          <a:fillRef idx="1">
-            <a:schemeClr val="accent1"/>
-          </a:fillRef>
-          <a:effectRef idx="0">
-            <a:schemeClr val="accent1"/>
-          </a:effectRef>
-          <a:fontRef idx="minor">
-            <a:schemeClr val="lt1"/>
-          </a:fontRef>
-        </p:style>
-        <p:txBody>
-          <a:bodyPr rtlCol="0" anchor="ctr"/>
-          <a:lstStyle/>
-          <a:p>
-            <a:pPr algn="ctr"/>
-            <a:endParaRPr lang="en-US" sz="1100"/>
-          </a:p>
-        </p:txBody>
-      </p:sp>
-      <p:sp>
-        <p:nvSpPr>
-          <p:cNvPr id="26" name="Oval 25">
-            <a:extLst>
-              <a:ext uri="{FF2B5EF4-FFF2-40B4-BE49-F238E27FC236}">
-                <a16:creationId xmlns:a16="http://schemas.microsoft.com/office/drawing/2014/main" id="{4CF8E337-8815-4A02-8E50-B186E53AAE11}"/>
-              </a:ext>
-            </a:extLst>
-          </p:cNvPr>
-          <p:cNvSpPr/>
-          <p:nvPr/>
-        </p:nvSpPr>
-        <p:spPr>
-          <a:xfrm>
-            <a:off x="5136073" y="2174129"/>
-            <a:ext cx="1123709" cy="585788"/>
-          </a:xfrm>
-          <a:prstGeom prst="ellipse">
-            <a:avLst/>
-          </a:prstGeom>
-          <a:solidFill>
-            <a:srgbClr val="0070C0"/>
-          </a:solidFill>
-          <a:ln>
-            <a:noFill/>
-          </a:ln>
-        </p:spPr>
-        <p:style>
-          <a:lnRef idx="2">
-            <a:schemeClr val="accent1">
-              <a:shade val="50000"/>
-            </a:schemeClr>
-          </a:lnRef>
-          <a:fillRef idx="1">
-            <a:schemeClr val="accent1"/>
-          </a:fillRef>
-          <a:effectRef idx="0">
-            <a:schemeClr val="accent1"/>
-          </a:effectRef>
-          <a:fontRef idx="minor">
-            <a:schemeClr val="lt1"/>
-          </a:fontRef>
-        </p:style>
-        <p:txBody>
-          <a:bodyPr rtlCol="0" anchor="ctr"/>
-          <a:lstStyle/>
-          <a:p>
-            <a:pPr algn="ctr"/>
-            <a:r>
-              <a:rPr lang="en-US" sz="2400" b="1" dirty="0">
-                <a:solidFill>
-                  <a:sysClr val="windowText" lastClr="000000"/>
-                </a:solidFill>
-              </a:rPr>
-              <a:t>API</a:t>
-            </a:r>
-          </a:p>
-        </p:txBody>
-      </p:sp>
-      <p:sp>
-        <p:nvSpPr>
-          <p:cNvPr id="27" name="Arrow: Striped Right 26">
-            <a:extLst>
-              <a:ext uri="{FF2B5EF4-FFF2-40B4-BE49-F238E27FC236}">
-                <a16:creationId xmlns:a16="http://schemas.microsoft.com/office/drawing/2014/main" id="{CED5875F-20B2-4A47-B2E2-2666EAE7C980}"/>
-              </a:ext>
-            </a:extLst>
-          </p:cNvPr>
-          <p:cNvSpPr/>
-          <p:nvPr/>
-        </p:nvSpPr>
-        <p:spPr>
-          <a:xfrm>
-            <a:off x="4298338" y="3120650"/>
-            <a:ext cx="682589" cy="338105"/>
-          </a:xfrm>
-          <a:prstGeom prst="stripedRightArrow">
-            <a:avLst/>
-          </a:prstGeom>
-          <a:solidFill>
-            <a:srgbClr val="00B050"/>
-          </a:solidFill>
-          <a:ln>
-            <a:noFill/>
-          </a:ln>
-        </p:spPr>
-        <p:style>
-          <a:lnRef idx="2">
-            <a:schemeClr val="accent1">
-              <a:shade val="50000"/>
-            </a:schemeClr>
-          </a:lnRef>
-          <a:fillRef idx="1">
-            <a:schemeClr val="accent1"/>
-          </a:fillRef>
-          <a:effectRef idx="0">
-            <a:schemeClr val="accent1"/>
-          </a:effectRef>
-          <a:fontRef idx="minor">
-            <a:schemeClr val="lt1"/>
-          </a:fontRef>
-        </p:style>
-        <p:txBody>
-          <a:bodyPr rtlCol="0" anchor="ctr"/>
-          <a:lstStyle/>
-          <a:p>
-            <a:pPr algn="ctr"/>
-            <a:endParaRPr lang="en-US" sz="1100"/>
-          </a:p>
-        </p:txBody>
-      </p:sp>
-      <p:sp>
-        <p:nvSpPr>
-          <p:cNvPr id="28" name="Oval 27">
-            <a:extLst>
-              <a:ext uri="{FF2B5EF4-FFF2-40B4-BE49-F238E27FC236}">
-                <a16:creationId xmlns:a16="http://schemas.microsoft.com/office/drawing/2014/main" id="{A5AE0CA4-3B76-4377-BDCA-E15ABCE4348A}"/>
-              </a:ext>
-            </a:extLst>
-          </p:cNvPr>
-          <p:cNvSpPr/>
-          <p:nvPr/>
-        </p:nvSpPr>
-        <p:spPr>
-          <a:xfrm>
-            <a:off x="5136073" y="2996809"/>
-            <a:ext cx="1123709" cy="585788"/>
-          </a:xfrm>
-          <a:prstGeom prst="ellipse">
-            <a:avLst/>
-          </a:prstGeom>
-          <a:solidFill>
-            <a:schemeClr val="accent2">
-              <a:lumMod val="60000"/>
-              <a:lumOff val="40000"/>
-            </a:schemeClr>
-          </a:solidFill>
-          <a:ln>
-            <a:noFill/>
-          </a:ln>
-        </p:spPr>
-        <p:style>
-          <a:lnRef idx="2">
-            <a:schemeClr val="accent1">
-              <a:shade val="50000"/>
-            </a:schemeClr>
-          </a:lnRef>
-          <a:fillRef idx="1">
-            <a:schemeClr val="accent1"/>
-          </a:fillRef>
-          <a:effectRef idx="0">
-            <a:schemeClr val="accent1"/>
-          </a:effectRef>
-          <a:fontRef idx="minor">
-            <a:schemeClr val="lt1"/>
-          </a:fontRef>
-        </p:style>
-        <p:txBody>
-          <a:bodyPr rtlCol="0" anchor="ctr"/>
-          <a:lstStyle/>
-          <a:p>
-            <a:pPr algn="ctr"/>
-            <a:r>
-              <a:rPr lang="en-US" sz="2400" b="1" dirty="0">
-                <a:solidFill>
-                  <a:sysClr val="windowText" lastClr="000000"/>
-                </a:solidFill>
-              </a:rPr>
-              <a:t>API</a:t>
-            </a:r>
-          </a:p>
-        </p:txBody>
-      </p:sp>
+            <a:ln w="38100">
+              <a:solidFill>
+                <a:schemeClr val="tx1"/>
+              </a:solidFill>
+            </a:ln>
+          </p:spPr>
+          <p:style>
+            <a:lnRef idx="2">
+              <a:schemeClr val="accent1">
+                <a:shade val="50000"/>
+              </a:schemeClr>
+            </a:lnRef>
+            <a:fillRef idx="1">
+              <a:schemeClr val="accent1"/>
+            </a:fillRef>
+            <a:effectRef idx="0">
+              <a:schemeClr val="accent1"/>
+            </a:effectRef>
+            <a:fontRef idx="minor">
+              <a:schemeClr val="lt1"/>
+            </a:fontRef>
+          </p:style>
+          <p:txBody>
+            <a:bodyPr rtlCol="0" anchor="ctr"/>
+            <a:lstStyle/>
+            <a:p>
+              <a:pPr algn="ctr"/>
+              <a:r>
+                <a:rPr lang="en-US" sz="2000" dirty="0">
+                  <a:solidFill>
+                    <a:sysClr val="windowText" lastClr="000000"/>
+                  </a:solidFill>
+                </a:rPr>
+                <a:t>DB C</a:t>
+              </a:r>
+            </a:p>
+          </p:txBody>
+        </p:sp>
+        <p:sp>
+          <p:nvSpPr>
+            <p:cNvPr id="23" name="Arrow: Striped Right 22">
+              <a:extLst>
+                <a:ext uri="{FF2B5EF4-FFF2-40B4-BE49-F238E27FC236}">
+                  <a16:creationId xmlns:a16="http://schemas.microsoft.com/office/drawing/2014/main" id="{CAC61167-D756-4AF4-8780-C432AF421D73}"/>
+                </a:ext>
+              </a:extLst>
+            </p:cNvPr>
+            <p:cNvSpPr/>
+            <p:nvPr/>
+          </p:nvSpPr>
+          <p:spPr>
+            <a:xfrm>
+              <a:off x="4298338" y="1481980"/>
+              <a:ext cx="682589" cy="338105"/>
+            </a:xfrm>
+            <a:prstGeom prst="stripedRightArrow">
+              <a:avLst/>
+            </a:prstGeom>
+            <a:solidFill>
+              <a:srgbClr val="00B050"/>
+            </a:solidFill>
+            <a:ln>
+              <a:noFill/>
+            </a:ln>
+          </p:spPr>
+          <p:style>
+            <a:lnRef idx="2">
+              <a:schemeClr val="accent1">
+                <a:shade val="50000"/>
+              </a:schemeClr>
+            </a:lnRef>
+            <a:fillRef idx="1">
+              <a:schemeClr val="accent1"/>
+            </a:fillRef>
+            <a:effectRef idx="0">
+              <a:schemeClr val="accent1"/>
+            </a:effectRef>
+            <a:fontRef idx="minor">
+              <a:schemeClr val="lt1"/>
+            </a:fontRef>
+          </p:style>
+          <p:txBody>
+            <a:bodyPr rtlCol="0" anchor="ctr"/>
+            <a:lstStyle/>
+            <a:p>
+              <a:pPr algn="ctr"/>
+              <a:endParaRPr lang="en-US" sz="1100"/>
+            </a:p>
+          </p:txBody>
+        </p:sp>
+        <p:sp>
+          <p:nvSpPr>
+            <p:cNvPr id="24" name="Oval 23">
+              <a:extLst>
+                <a:ext uri="{FF2B5EF4-FFF2-40B4-BE49-F238E27FC236}">
+                  <a16:creationId xmlns:a16="http://schemas.microsoft.com/office/drawing/2014/main" id="{E7F5DDC8-412F-426A-9B36-3063369907D8}"/>
+                </a:ext>
+              </a:extLst>
+            </p:cNvPr>
+            <p:cNvSpPr/>
+            <p:nvPr/>
+          </p:nvSpPr>
+          <p:spPr>
+            <a:xfrm>
+              <a:off x="5136073" y="1358138"/>
+              <a:ext cx="1123709" cy="585788"/>
+            </a:xfrm>
+            <a:prstGeom prst="ellipse">
+              <a:avLst/>
+            </a:prstGeom>
+            <a:solidFill>
+              <a:srgbClr val="FFFF00"/>
+            </a:solidFill>
+            <a:ln>
+              <a:noFill/>
+            </a:ln>
+          </p:spPr>
+          <p:style>
+            <a:lnRef idx="2">
+              <a:schemeClr val="accent1">
+                <a:shade val="50000"/>
+              </a:schemeClr>
+            </a:lnRef>
+            <a:fillRef idx="1">
+              <a:schemeClr val="accent1"/>
+            </a:fillRef>
+            <a:effectRef idx="0">
+              <a:schemeClr val="accent1"/>
+            </a:effectRef>
+            <a:fontRef idx="minor">
+              <a:schemeClr val="lt1"/>
+            </a:fontRef>
+          </p:style>
+          <p:txBody>
+            <a:bodyPr rtlCol="0" anchor="ctr"/>
+            <a:lstStyle/>
+            <a:p>
+              <a:pPr algn="ctr"/>
+              <a:r>
+                <a:rPr lang="en-US" sz="2400" b="1" dirty="0">
+                  <a:solidFill>
+                    <a:sysClr val="windowText" lastClr="000000"/>
+                  </a:solidFill>
+                </a:rPr>
+                <a:t>API</a:t>
+              </a:r>
+            </a:p>
+          </p:txBody>
+        </p:sp>
+        <p:sp>
+          <p:nvSpPr>
+            <p:cNvPr id="25" name="Arrow: Striped Right 24">
+              <a:extLst>
+                <a:ext uri="{FF2B5EF4-FFF2-40B4-BE49-F238E27FC236}">
+                  <a16:creationId xmlns:a16="http://schemas.microsoft.com/office/drawing/2014/main" id="{D5AB0F49-D7D6-4139-AB8A-CB4403FE8242}"/>
+                </a:ext>
+              </a:extLst>
+            </p:cNvPr>
+            <p:cNvSpPr/>
+            <p:nvPr/>
+          </p:nvSpPr>
+          <p:spPr>
+            <a:xfrm>
+              <a:off x="4298338" y="2297970"/>
+              <a:ext cx="682589" cy="338105"/>
+            </a:xfrm>
+            <a:prstGeom prst="stripedRightArrow">
+              <a:avLst/>
+            </a:prstGeom>
+            <a:solidFill>
+              <a:srgbClr val="00B050"/>
+            </a:solidFill>
+            <a:ln>
+              <a:noFill/>
+            </a:ln>
+          </p:spPr>
+          <p:style>
+            <a:lnRef idx="2">
+              <a:schemeClr val="accent1">
+                <a:shade val="50000"/>
+              </a:schemeClr>
+            </a:lnRef>
+            <a:fillRef idx="1">
+              <a:schemeClr val="accent1"/>
+            </a:fillRef>
+            <a:effectRef idx="0">
+              <a:schemeClr val="accent1"/>
+            </a:effectRef>
+            <a:fontRef idx="minor">
+              <a:schemeClr val="lt1"/>
+            </a:fontRef>
+          </p:style>
+          <p:txBody>
+            <a:bodyPr rtlCol="0" anchor="ctr"/>
+            <a:lstStyle/>
+            <a:p>
+              <a:pPr algn="ctr"/>
+              <a:endParaRPr lang="en-US" sz="1100"/>
+            </a:p>
+          </p:txBody>
+        </p:sp>
+        <p:sp>
+          <p:nvSpPr>
+            <p:cNvPr id="26" name="Oval 25">
+              <a:extLst>
+                <a:ext uri="{FF2B5EF4-FFF2-40B4-BE49-F238E27FC236}">
+                  <a16:creationId xmlns:a16="http://schemas.microsoft.com/office/drawing/2014/main" id="{4CF8E337-8815-4A02-8E50-B186E53AAE11}"/>
+                </a:ext>
+              </a:extLst>
+            </p:cNvPr>
+            <p:cNvSpPr/>
+            <p:nvPr/>
+          </p:nvSpPr>
+          <p:spPr>
+            <a:xfrm>
+              <a:off x="5136073" y="2174129"/>
+              <a:ext cx="1123709" cy="585788"/>
+            </a:xfrm>
+            <a:prstGeom prst="ellipse">
+              <a:avLst/>
+            </a:prstGeom>
+            <a:solidFill>
+              <a:srgbClr val="0070C0"/>
+            </a:solidFill>
+            <a:ln>
+              <a:noFill/>
+            </a:ln>
+          </p:spPr>
+          <p:style>
+            <a:lnRef idx="2">
+              <a:schemeClr val="accent1">
+                <a:shade val="50000"/>
+              </a:schemeClr>
+            </a:lnRef>
+            <a:fillRef idx="1">
+              <a:schemeClr val="accent1"/>
+            </a:fillRef>
+            <a:effectRef idx="0">
+              <a:schemeClr val="accent1"/>
+            </a:effectRef>
+            <a:fontRef idx="minor">
+              <a:schemeClr val="lt1"/>
+            </a:fontRef>
+          </p:style>
+          <p:txBody>
+            <a:bodyPr rtlCol="0" anchor="ctr"/>
+            <a:lstStyle/>
+            <a:p>
+              <a:pPr algn="ctr"/>
+              <a:r>
+                <a:rPr lang="en-US" sz="2400" b="1" dirty="0">
+                  <a:solidFill>
+                    <a:sysClr val="windowText" lastClr="000000"/>
+                  </a:solidFill>
+                </a:rPr>
+                <a:t>API</a:t>
+              </a:r>
+            </a:p>
+          </p:txBody>
+        </p:sp>
+        <p:sp>
+          <p:nvSpPr>
+            <p:cNvPr id="27" name="Arrow: Striped Right 26">
+              <a:extLst>
+                <a:ext uri="{FF2B5EF4-FFF2-40B4-BE49-F238E27FC236}">
+                  <a16:creationId xmlns:a16="http://schemas.microsoft.com/office/drawing/2014/main" id="{CED5875F-20B2-4A47-B2E2-2666EAE7C980}"/>
+                </a:ext>
+              </a:extLst>
+            </p:cNvPr>
+            <p:cNvSpPr/>
+            <p:nvPr/>
+          </p:nvSpPr>
+          <p:spPr>
+            <a:xfrm>
+              <a:off x="4298338" y="3120650"/>
+              <a:ext cx="682589" cy="338105"/>
+            </a:xfrm>
+            <a:prstGeom prst="stripedRightArrow">
+              <a:avLst/>
+            </a:prstGeom>
+            <a:solidFill>
+              <a:srgbClr val="00B050"/>
+            </a:solidFill>
+            <a:ln>
+              <a:noFill/>
+            </a:ln>
+          </p:spPr>
+          <p:style>
+            <a:lnRef idx="2">
+              <a:schemeClr val="accent1">
+                <a:shade val="50000"/>
+              </a:schemeClr>
+            </a:lnRef>
+            <a:fillRef idx="1">
+              <a:schemeClr val="accent1"/>
+            </a:fillRef>
+            <a:effectRef idx="0">
+              <a:schemeClr val="accent1"/>
+            </a:effectRef>
+            <a:fontRef idx="minor">
+              <a:schemeClr val="lt1"/>
+            </a:fontRef>
+          </p:style>
+          <p:txBody>
+            <a:bodyPr rtlCol="0" anchor="ctr"/>
+            <a:lstStyle/>
+            <a:p>
+              <a:pPr algn="ctr"/>
+              <a:endParaRPr lang="en-US" sz="1100"/>
+            </a:p>
+          </p:txBody>
+        </p:sp>
+        <p:sp>
+          <p:nvSpPr>
+            <p:cNvPr id="28" name="Oval 27">
+              <a:extLst>
+                <a:ext uri="{FF2B5EF4-FFF2-40B4-BE49-F238E27FC236}">
+                  <a16:creationId xmlns:a16="http://schemas.microsoft.com/office/drawing/2014/main" id="{A5AE0CA4-3B76-4377-BDCA-E15ABCE4348A}"/>
+                </a:ext>
+              </a:extLst>
+            </p:cNvPr>
+            <p:cNvSpPr/>
+            <p:nvPr/>
+          </p:nvSpPr>
+          <p:spPr>
+            <a:xfrm>
+              <a:off x="5136073" y="2996809"/>
+              <a:ext cx="1123709" cy="585788"/>
+            </a:xfrm>
+            <a:prstGeom prst="ellipse">
+              <a:avLst/>
+            </a:prstGeom>
+            <a:solidFill>
+              <a:schemeClr val="accent2">
+                <a:lumMod val="60000"/>
+                <a:lumOff val="40000"/>
+              </a:schemeClr>
+            </a:solidFill>
+            <a:ln>
+              <a:noFill/>
+            </a:ln>
+          </p:spPr>
+          <p:style>
+            <a:lnRef idx="2">
+              <a:schemeClr val="accent1">
+                <a:shade val="50000"/>
+              </a:schemeClr>
+            </a:lnRef>
+            <a:fillRef idx="1">
+              <a:schemeClr val="accent1"/>
+            </a:fillRef>
+            <a:effectRef idx="0">
+              <a:schemeClr val="accent1"/>
+            </a:effectRef>
+            <a:fontRef idx="minor">
+              <a:schemeClr val="lt1"/>
+            </a:fontRef>
+          </p:style>
+          <p:txBody>
+            <a:bodyPr rtlCol="0" anchor="ctr"/>
+            <a:lstStyle/>
+            <a:p>
+              <a:pPr algn="ctr"/>
+              <a:r>
+                <a:rPr lang="en-US" sz="2400" b="1" dirty="0">
+                  <a:solidFill>
+                    <a:sysClr val="windowText" lastClr="000000"/>
+                  </a:solidFill>
+                </a:rPr>
+                <a:t>API</a:t>
+              </a:r>
+            </a:p>
+          </p:txBody>
+        </p:sp>
+      </p:grpSp>
       <p:sp>
         <p:nvSpPr>
           <p:cNvPr id="29" name="TextBox 28">
@@ -19731,7 +20364,7 @@
         </p:nvGrpSpPr>
         <p:grpSpPr>
           <a:xfrm>
-            <a:off x="2286711" y="4384929"/>
+            <a:off x="2286711" y="5132400"/>
             <a:ext cx="5388431" cy="3327213"/>
             <a:chOff x="934858" y="1741763"/>
             <a:chExt cx="11127440" cy="6870898"/>
@@ -20524,7 +21157,7 @@
         </p:nvSpPr>
         <p:spPr>
           <a:xfrm>
-            <a:off x="1684798" y="7866436"/>
+            <a:off x="1684798" y="8613907"/>
             <a:ext cx="6231605" cy="338554"/>
           </a:xfrm>
           <a:prstGeom prst="rect">
@@ -20542,6 +21175,472 @@
             <a:r>
               <a:rPr lang="en-US" sz="1600" b="1" dirty="0"/>
               <a:t>Figure 1.4 – Creating or Reusing Existing User Interfaces</a:t>
+            </a:r>
+          </a:p>
+        </p:txBody>
+      </p:sp>
+      <p:sp>
+        <p:nvSpPr>
+          <p:cNvPr id="45" name="TextBox 44">
+            <a:extLst>
+              <a:ext uri="{FF2B5EF4-FFF2-40B4-BE49-F238E27FC236}">
+                <a16:creationId xmlns:a16="http://schemas.microsoft.com/office/drawing/2014/main" id="{A1DC14B7-645D-4B93-9848-9277976764D4}"/>
+              </a:ext>
+            </a:extLst>
+          </p:cNvPr>
+          <p:cNvSpPr txBox="1"/>
+          <p:nvPr/>
+        </p:nvSpPr>
+        <p:spPr>
+          <a:xfrm>
+            <a:off x="858540" y="9117393"/>
+            <a:ext cx="8082259" cy="1077218"/>
+          </a:xfrm>
+          <a:prstGeom prst="rect">
+            <a:avLst/>
+          </a:prstGeom>
+          <a:noFill/>
+        </p:spPr>
+        <p:txBody>
+          <a:bodyPr wrap="square" rtlCol="0">
+            <a:spAutoFit/>
+          </a:bodyPr>
+          <a:lstStyle/>
+          <a:p>
+            <a:pPr algn="just"/>
+            <a:r>
+              <a:rPr lang="en-US" sz="1600" dirty="0"/>
+              <a:t>User interfaces can be reused or be created only when necessary as microservices architecture only affect the back-end of the system as illustrated in </a:t>
+            </a:r>
+            <a:r>
+              <a:rPr lang="en-US" sz="1600" b="1" i="1" dirty="0"/>
+              <a:t>Figure 1.4</a:t>
+            </a:r>
+            <a:r>
+              <a:rPr lang="en-US" sz="1600" dirty="0"/>
+              <a:t>. However some of the APIs’ end points should be reconfigure. In the case where the decision is to convert the business logic into subscription based, then changes must be done to the user interface to fit the logics.</a:t>
+            </a:r>
+          </a:p>
+        </p:txBody>
+      </p:sp>
+      <p:sp>
+        <p:nvSpPr>
+          <p:cNvPr id="46" name="TextBox 45">
+            <a:extLst>
+              <a:ext uri="{FF2B5EF4-FFF2-40B4-BE49-F238E27FC236}">
+                <a16:creationId xmlns:a16="http://schemas.microsoft.com/office/drawing/2014/main" id="{CCA48D75-669D-4E2A-86E1-C4D460E16188}"/>
+              </a:ext>
+            </a:extLst>
+          </p:cNvPr>
+          <p:cNvSpPr txBox="1"/>
+          <p:nvPr/>
+        </p:nvSpPr>
+        <p:spPr>
+          <a:xfrm>
+            <a:off x="858540" y="3711312"/>
+            <a:ext cx="8082259" cy="830997"/>
+          </a:xfrm>
+          <a:prstGeom prst="rect">
+            <a:avLst/>
+          </a:prstGeom>
+          <a:noFill/>
+        </p:spPr>
+        <p:txBody>
+          <a:bodyPr wrap="square" rtlCol="0">
+            <a:spAutoFit/>
+          </a:bodyPr>
+          <a:lstStyle/>
+          <a:p>
+            <a:pPr algn="just"/>
+            <a:r>
+              <a:rPr lang="en-US" sz="1600" b="1" i="1" dirty="0"/>
+              <a:t>Figure 1.3 </a:t>
+            </a:r>
+            <a:r>
+              <a:rPr lang="en-US" sz="1600" dirty="0"/>
+              <a:t>shows the illustration on APIs creation from databases. As databases schema would be different that in monolithic architecture, for every databases, new APIs end points will be created according to the each services business logic and their relationships.</a:t>
+            </a:r>
+          </a:p>
+        </p:txBody>
+      </p:sp>
+      <p:cxnSp>
+        <p:nvCxnSpPr>
+          <p:cNvPr id="47" name="Straight Connector 46">
+            <a:extLst>
+              <a:ext uri="{FF2B5EF4-FFF2-40B4-BE49-F238E27FC236}">
+                <a16:creationId xmlns:a16="http://schemas.microsoft.com/office/drawing/2014/main" id="{1175FB1E-912B-4467-BB47-0F3BC870BECE}"/>
+              </a:ext>
+            </a:extLst>
+          </p:cNvPr>
+          <p:cNvCxnSpPr>
+            <a:cxnSpLocks/>
+          </p:cNvCxnSpPr>
+          <p:nvPr/>
+        </p:nvCxnSpPr>
+        <p:spPr>
+          <a:xfrm>
+            <a:off x="438150" y="10360347"/>
+            <a:ext cx="8724900" cy="0"/>
+          </a:xfrm>
+          <a:prstGeom prst="line">
+            <a:avLst/>
+          </a:prstGeom>
+          <a:ln>
+            <a:solidFill>
+              <a:schemeClr val="bg1">
+                <a:lumMod val="85000"/>
+              </a:schemeClr>
+            </a:solidFill>
+          </a:ln>
+        </p:spPr>
+        <p:style>
+          <a:lnRef idx="1">
+            <a:schemeClr val="accent1"/>
+          </a:lnRef>
+          <a:fillRef idx="0">
+            <a:schemeClr val="accent1"/>
+          </a:fillRef>
+          <a:effectRef idx="0">
+            <a:schemeClr val="accent1"/>
+          </a:effectRef>
+          <a:fontRef idx="minor">
+            <a:schemeClr val="tx1"/>
+          </a:fontRef>
+        </p:style>
+      </p:cxnSp>
+      <p:sp>
+        <p:nvSpPr>
+          <p:cNvPr id="48" name="TextBox 47">
+            <a:extLst>
+              <a:ext uri="{FF2B5EF4-FFF2-40B4-BE49-F238E27FC236}">
+                <a16:creationId xmlns:a16="http://schemas.microsoft.com/office/drawing/2014/main" id="{2E06EEC0-BA42-4BA4-9426-3E3C3F25883A}"/>
+              </a:ext>
+            </a:extLst>
+          </p:cNvPr>
+          <p:cNvSpPr txBox="1"/>
+          <p:nvPr/>
+        </p:nvSpPr>
+        <p:spPr>
+          <a:xfrm>
+            <a:off x="858539" y="10487777"/>
+            <a:ext cx="8082257" cy="400110"/>
+          </a:xfrm>
+          <a:prstGeom prst="rect">
+            <a:avLst/>
+          </a:prstGeom>
+          <a:noFill/>
+        </p:spPr>
+        <p:txBody>
+          <a:bodyPr wrap="square" rtlCol="0">
+            <a:spAutoFit/>
+          </a:bodyPr>
+          <a:lstStyle/>
+          <a:p>
+            <a:r>
+              <a:rPr lang="en-US" sz="2000" b="1" u="sng" dirty="0"/>
+              <a:t>CONCLUSION</a:t>
+            </a:r>
+          </a:p>
+        </p:txBody>
+      </p:sp>
+      <p:sp>
+        <p:nvSpPr>
+          <p:cNvPr id="49" name="TextBox 48">
+            <a:extLst>
+              <a:ext uri="{FF2B5EF4-FFF2-40B4-BE49-F238E27FC236}">
+                <a16:creationId xmlns:a16="http://schemas.microsoft.com/office/drawing/2014/main" id="{AAD31983-BEDE-402B-812E-0EDFAA6B28F7}"/>
+              </a:ext>
+            </a:extLst>
+          </p:cNvPr>
+          <p:cNvSpPr txBox="1"/>
+          <p:nvPr/>
+        </p:nvSpPr>
+        <p:spPr>
+          <a:xfrm>
+            <a:off x="858537" y="10887887"/>
+            <a:ext cx="8082259" cy="1077218"/>
+          </a:xfrm>
+          <a:prstGeom prst="rect">
+            <a:avLst/>
+          </a:prstGeom>
+          <a:noFill/>
+        </p:spPr>
+        <p:txBody>
+          <a:bodyPr wrap="square" rtlCol="0">
+            <a:spAutoFit/>
+          </a:bodyPr>
+          <a:lstStyle/>
+          <a:p>
+            <a:pPr algn="just"/>
+            <a:r>
+              <a:rPr lang="en-US" sz="1600" dirty="0"/>
+              <a:t>Migrating from monolithic architecture to microservices architecture will have the disadvantages and advantages. As we compared them together, we can see that microservices obviously provide better scalability as progression growth. Regardless, we still have to look for the possible issues that could occur. </a:t>
+            </a:r>
+          </a:p>
+        </p:txBody>
+      </p:sp>
+      <p:sp>
+        <p:nvSpPr>
+          <p:cNvPr id="50" name="Footer Placeholder 8">
+            <a:extLst>
+              <a:ext uri="{FF2B5EF4-FFF2-40B4-BE49-F238E27FC236}">
+                <a16:creationId xmlns:a16="http://schemas.microsoft.com/office/drawing/2014/main" id="{E117580D-F488-4EFA-A786-31B85B9A75FC}"/>
+              </a:ext>
+            </a:extLst>
+          </p:cNvPr>
+          <p:cNvSpPr txBox="1">
+            <a:spLocks/>
+          </p:cNvSpPr>
+          <p:nvPr/>
+        </p:nvSpPr>
+        <p:spPr>
+          <a:xfrm>
+            <a:off x="4723876" y="182064"/>
+            <a:ext cx="4439174" cy="681567"/>
+          </a:xfrm>
+          <a:prstGeom prst="rect">
+            <a:avLst/>
+          </a:prstGeom>
+        </p:spPr>
+        <p:txBody>
+          <a:bodyPr vert="horz" lIns="91440" tIns="45720" rIns="91440" bIns="45720" rtlCol="0" anchor="ctr"/>
+          <a:lstStyle>
+            <a:defPPr>
+              <a:defRPr lang="en-US"/>
+            </a:defPPr>
+            <a:lvl1pPr marL="0" algn="ctr" defTabSz="457200" rtl="0" eaLnBrk="1" latinLnBrk="0" hangingPunct="1">
+              <a:defRPr sz="1260" kern="1200">
+                <a:solidFill>
+                  <a:schemeClr val="tx1">
+                    <a:tint val="75000"/>
+                  </a:schemeClr>
+                </a:solidFill>
+                <a:latin typeface="+mn-lt"/>
+                <a:ea typeface="+mn-ea"/>
+                <a:cs typeface="+mn-cs"/>
+              </a:defRPr>
+            </a:lvl1pPr>
+            <a:lvl2pPr marL="457200" algn="l" defTabSz="457200" rtl="0" eaLnBrk="1" latinLnBrk="0" hangingPunct="1">
+              <a:defRPr sz="1800" kern="1200">
+                <a:solidFill>
+                  <a:schemeClr val="tx1"/>
+                </a:solidFill>
+                <a:latin typeface="+mn-lt"/>
+                <a:ea typeface="+mn-ea"/>
+                <a:cs typeface="+mn-cs"/>
+              </a:defRPr>
+            </a:lvl2pPr>
+            <a:lvl3pPr marL="914400" algn="l" defTabSz="457200" rtl="0" eaLnBrk="1" latinLnBrk="0" hangingPunct="1">
+              <a:defRPr sz="1800" kern="1200">
+                <a:solidFill>
+                  <a:schemeClr val="tx1"/>
+                </a:solidFill>
+                <a:latin typeface="+mn-lt"/>
+                <a:ea typeface="+mn-ea"/>
+                <a:cs typeface="+mn-cs"/>
+              </a:defRPr>
+            </a:lvl3pPr>
+            <a:lvl4pPr marL="1371600" algn="l" defTabSz="457200" rtl="0" eaLnBrk="1" latinLnBrk="0" hangingPunct="1">
+              <a:defRPr sz="1800" kern="1200">
+                <a:solidFill>
+                  <a:schemeClr val="tx1"/>
+                </a:solidFill>
+                <a:latin typeface="+mn-lt"/>
+                <a:ea typeface="+mn-ea"/>
+                <a:cs typeface="+mn-cs"/>
+              </a:defRPr>
+            </a:lvl4pPr>
+            <a:lvl5pPr marL="1828800" algn="l" defTabSz="457200" rtl="0" eaLnBrk="1" latinLnBrk="0" hangingPunct="1">
+              <a:defRPr sz="1800" kern="1200">
+                <a:solidFill>
+                  <a:schemeClr val="tx1"/>
+                </a:solidFill>
+                <a:latin typeface="+mn-lt"/>
+                <a:ea typeface="+mn-ea"/>
+                <a:cs typeface="+mn-cs"/>
+              </a:defRPr>
+            </a:lvl5pPr>
+            <a:lvl6pPr marL="2286000" algn="l" defTabSz="457200" rtl="0" eaLnBrk="1" latinLnBrk="0" hangingPunct="1">
+              <a:defRPr sz="1800" kern="1200">
+                <a:solidFill>
+                  <a:schemeClr val="tx1"/>
+                </a:solidFill>
+                <a:latin typeface="+mn-lt"/>
+                <a:ea typeface="+mn-ea"/>
+                <a:cs typeface="+mn-cs"/>
+              </a:defRPr>
+            </a:lvl6pPr>
+            <a:lvl7pPr marL="2743200" algn="l" defTabSz="457200" rtl="0" eaLnBrk="1" latinLnBrk="0" hangingPunct="1">
+              <a:defRPr sz="1800" kern="1200">
+                <a:solidFill>
+                  <a:schemeClr val="tx1"/>
+                </a:solidFill>
+                <a:latin typeface="+mn-lt"/>
+                <a:ea typeface="+mn-ea"/>
+                <a:cs typeface="+mn-cs"/>
+              </a:defRPr>
+            </a:lvl7pPr>
+            <a:lvl8pPr marL="3200400" algn="l" defTabSz="457200" rtl="0" eaLnBrk="1" latinLnBrk="0" hangingPunct="1">
+              <a:defRPr sz="1800" kern="1200">
+                <a:solidFill>
+                  <a:schemeClr val="tx1"/>
+                </a:solidFill>
+                <a:latin typeface="+mn-lt"/>
+                <a:ea typeface="+mn-ea"/>
+                <a:cs typeface="+mn-cs"/>
+              </a:defRPr>
+            </a:lvl8pPr>
+            <a:lvl9pPr marL="3657600" algn="l" defTabSz="457200" rtl="0" eaLnBrk="1" latinLnBrk="0" hangingPunct="1">
+              <a:defRPr sz="1800" kern="1200">
+                <a:solidFill>
+                  <a:schemeClr val="tx1"/>
+                </a:solidFill>
+                <a:latin typeface="+mn-lt"/>
+                <a:ea typeface="+mn-ea"/>
+                <a:cs typeface="+mn-cs"/>
+              </a:defRPr>
+            </a:lvl9pPr>
+          </a:lstStyle>
+          <a:p>
+            <a:pPr algn="r"/>
+            <a:r>
+              <a:rPr lang="en-US" dirty="0" err="1"/>
+              <a:t>ViMiGo</a:t>
+            </a:r>
+            <a:r>
+              <a:rPr lang="en-US" dirty="0"/>
+              <a:t> Writing Assessment – NASRUL ARIF BIN ZAKRIA</a:t>
+            </a:r>
+          </a:p>
+        </p:txBody>
+      </p:sp>
+      <p:sp>
+        <p:nvSpPr>
+          <p:cNvPr id="51" name="Footer Placeholder 8">
+            <a:extLst>
+              <a:ext uri="{FF2B5EF4-FFF2-40B4-BE49-F238E27FC236}">
+                <a16:creationId xmlns:a16="http://schemas.microsoft.com/office/drawing/2014/main" id="{917E32FF-1B92-4ADE-9D66-116BF1B3992B}"/>
+              </a:ext>
+            </a:extLst>
+          </p:cNvPr>
+          <p:cNvSpPr txBox="1">
+            <a:spLocks/>
+          </p:cNvSpPr>
+          <p:nvPr/>
+        </p:nvSpPr>
+        <p:spPr>
+          <a:xfrm>
+            <a:off x="878690" y="180843"/>
+            <a:ext cx="4439174" cy="681567"/>
+          </a:xfrm>
+          <a:prstGeom prst="rect">
+            <a:avLst/>
+          </a:prstGeom>
+        </p:spPr>
+        <p:txBody>
+          <a:bodyPr vert="horz" lIns="91440" tIns="45720" rIns="91440" bIns="45720" rtlCol="0" anchor="ctr"/>
+          <a:lstStyle>
+            <a:defPPr>
+              <a:defRPr lang="en-US"/>
+            </a:defPPr>
+            <a:lvl1pPr marL="0" algn="ctr" defTabSz="457200" rtl="0" eaLnBrk="1" latinLnBrk="0" hangingPunct="1">
+              <a:defRPr sz="1260" kern="1200">
+                <a:solidFill>
+                  <a:schemeClr val="tx1">
+                    <a:tint val="75000"/>
+                  </a:schemeClr>
+                </a:solidFill>
+                <a:latin typeface="+mn-lt"/>
+                <a:ea typeface="+mn-ea"/>
+                <a:cs typeface="+mn-cs"/>
+              </a:defRPr>
+            </a:lvl1pPr>
+            <a:lvl2pPr marL="457200" algn="l" defTabSz="457200" rtl="0" eaLnBrk="1" latinLnBrk="0" hangingPunct="1">
+              <a:defRPr sz="1800" kern="1200">
+                <a:solidFill>
+                  <a:schemeClr val="tx1"/>
+                </a:solidFill>
+                <a:latin typeface="+mn-lt"/>
+                <a:ea typeface="+mn-ea"/>
+                <a:cs typeface="+mn-cs"/>
+              </a:defRPr>
+            </a:lvl2pPr>
+            <a:lvl3pPr marL="914400" algn="l" defTabSz="457200" rtl="0" eaLnBrk="1" latinLnBrk="0" hangingPunct="1">
+              <a:defRPr sz="1800" kern="1200">
+                <a:solidFill>
+                  <a:schemeClr val="tx1"/>
+                </a:solidFill>
+                <a:latin typeface="+mn-lt"/>
+                <a:ea typeface="+mn-ea"/>
+                <a:cs typeface="+mn-cs"/>
+              </a:defRPr>
+            </a:lvl3pPr>
+            <a:lvl4pPr marL="1371600" algn="l" defTabSz="457200" rtl="0" eaLnBrk="1" latinLnBrk="0" hangingPunct="1">
+              <a:defRPr sz="1800" kern="1200">
+                <a:solidFill>
+                  <a:schemeClr val="tx1"/>
+                </a:solidFill>
+                <a:latin typeface="+mn-lt"/>
+                <a:ea typeface="+mn-ea"/>
+                <a:cs typeface="+mn-cs"/>
+              </a:defRPr>
+            </a:lvl4pPr>
+            <a:lvl5pPr marL="1828800" algn="l" defTabSz="457200" rtl="0" eaLnBrk="1" latinLnBrk="0" hangingPunct="1">
+              <a:defRPr sz="1800" kern="1200">
+                <a:solidFill>
+                  <a:schemeClr val="tx1"/>
+                </a:solidFill>
+                <a:latin typeface="+mn-lt"/>
+                <a:ea typeface="+mn-ea"/>
+                <a:cs typeface="+mn-cs"/>
+              </a:defRPr>
+            </a:lvl5pPr>
+            <a:lvl6pPr marL="2286000" algn="l" defTabSz="457200" rtl="0" eaLnBrk="1" latinLnBrk="0" hangingPunct="1">
+              <a:defRPr sz="1800" kern="1200">
+                <a:solidFill>
+                  <a:schemeClr val="tx1"/>
+                </a:solidFill>
+                <a:latin typeface="+mn-lt"/>
+                <a:ea typeface="+mn-ea"/>
+                <a:cs typeface="+mn-cs"/>
+              </a:defRPr>
+            </a:lvl6pPr>
+            <a:lvl7pPr marL="2743200" algn="l" defTabSz="457200" rtl="0" eaLnBrk="1" latinLnBrk="0" hangingPunct="1">
+              <a:defRPr sz="1800" kern="1200">
+                <a:solidFill>
+                  <a:schemeClr val="tx1"/>
+                </a:solidFill>
+                <a:latin typeface="+mn-lt"/>
+                <a:ea typeface="+mn-ea"/>
+                <a:cs typeface="+mn-cs"/>
+              </a:defRPr>
+            </a:lvl7pPr>
+            <a:lvl8pPr marL="3200400" algn="l" defTabSz="457200" rtl="0" eaLnBrk="1" latinLnBrk="0" hangingPunct="1">
+              <a:defRPr sz="1800" kern="1200">
+                <a:solidFill>
+                  <a:schemeClr val="tx1"/>
+                </a:solidFill>
+                <a:latin typeface="+mn-lt"/>
+                <a:ea typeface="+mn-ea"/>
+                <a:cs typeface="+mn-cs"/>
+              </a:defRPr>
+            </a:lvl8pPr>
+            <a:lvl9pPr marL="3657600" algn="l" defTabSz="457200" rtl="0" eaLnBrk="1" latinLnBrk="0" hangingPunct="1">
+              <a:defRPr sz="1800" kern="1200">
+                <a:solidFill>
+                  <a:schemeClr val="tx1"/>
+                </a:solidFill>
+                <a:latin typeface="+mn-lt"/>
+                <a:ea typeface="+mn-ea"/>
+                <a:cs typeface="+mn-cs"/>
+              </a:defRPr>
+            </a:lvl9pPr>
+          </a:lstStyle>
+          <a:p>
+            <a:pPr algn="l"/>
+            <a:r>
+              <a:rPr lang="en-US" dirty="0"/>
+              <a:t>Migration: Monolithic to Microservices</a:t>
             </a:r>
           </a:p>
         </p:txBody>

</xml_diff>